<commit_message>
add postgresql to design session
</commit_message>
<xml_diff>
--- a/Whiteboard design session/WDS trainer presentation - Cloud-native applications.pptx
+++ b/Whiteboard design session/WDS trainer presentation - Cloud-native applications.pptx
@@ -221,7 +221,7 @@
           <a:p>
             <a:fld id="{52A13B17-C506-4D51-BB37-16B365906619}" type="datetimeFigureOut">
               <a:rPr lang="en-US" smtClean="0"/>
-              <a:t>8/26/20</a:t>
+              <a:t>11/15/20</a:t>
             </a:fld>
             <a:endParaRPr lang="en-US" dirty="0"/>
           </a:p>
@@ -2168,7 +2168,7 @@
                   <a:prstClr val="black"/>
                 </a:solidFill>
               </a:rPr>
-              <a:t>8/26/20 3:07 AM</a:t>
+              <a:t>11/15/20 5:29 PM</a:t>
             </a:fld>
             <a:endParaRPr lang="en-US" dirty="0">
               <a:solidFill>
@@ -15025,7 +15025,7 @@
               </a:spcAft>
             </a:pPr>
             <a:r>
-              <a:rPr lang="en-US" sz="2800" dirty="0">
+              <a:rPr lang="en-US" sz="2400" dirty="0">
                 <a:solidFill>
                   <a:schemeClr val="tx1"/>
                 </a:solidFill>
@@ -15041,7 +15041,7 @@
               </a:spcAft>
             </a:pPr>
             <a:r>
-              <a:rPr lang="en-US" sz="2800" dirty="0">
+              <a:rPr lang="en-US" sz="2400" dirty="0">
                 <a:solidFill>
                   <a:schemeClr val="tx1"/>
                 </a:solidFill>
@@ -15057,7 +15057,7 @@
               </a:spcAft>
             </a:pPr>
             <a:r>
-              <a:rPr lang="en-US" sz="2800" dirty="0">
+              <a:rPr lang="en-US" sz="2400" dirty="0">
                 <a:solidFill>
                   <a:schemeClr val="tx1"/>
                 </a:solidFill>
@@ -15073,7 +15073,7 @@
               </a:spcAft>
             </a:pPr>
             <a:r>
-              <a:rPr lang="en-US" sz="2800" dirty="0">
+              <a:rPr lang="en-US" sz="2400" dirty="0">
                 <a:solidFill>
                   <a:schemeClr val="tx1"/>
                 </a:solidFill>
@@ -15089,7 +15089,23 @@
               </a:spcAft>
             </a:pPr>
             <a:r>
-              <a:rPr lang="en-US" sz="2800" dirty="0">
+              <a:rPr lang="en-US" sz="2400" dirty="0">
+                <a:solidFill>
+                  <a:schemeClr val="tx1"/>
+                </a:solidFill>
+                <a:latin typeface="+mj-lt"/>
+              </a:rPr>
+              <a:t>Migrate relational data from PostgreSQL on-premises databases to Microsoft Azure</a:t>
+            </a:r>
+          </a:p>
+          <a:p>
+            <a:pPr lvl="1">
+              <a:spcAft>
+                <a:spcPts val="882"/>
+              </a:spcAft>
+            </a:pPr>
+            <a:r>
+              <a:rPr lang="en-US" sz="2400" dirty="0">
                 <a:solidFill>
                   <a:schemeClr val="tx1"/>
                 </a:solidFill>
@@ -15105,7 +15121,7 @@
               </a:spcAft>
             </a:pPr>
             <a:r>
-              <a:rPr lang="en-US" sz="2800" dirty="0">
+              <a:rPr lang="en-US" sz="2400" dirty="0">
                 <a:solidFill>
                   <a:schemeClr val="tx1"/>
                 </a:solidFill>
@@ -15121,7 +15137,7 @@
               </a:spcAft>
             </a:pPr>
             <a:r>
-              <a:rPr lang="en-US" sz="2800" dirty="0">
+              <a:rPr lang="en-US" sz="2400" dirty="0">
                 <a:solidFill>
                   <a:schemeClr val="tx1"/>
                 </a:solidFill>
@@ -15137,7 +15153,7 @@
               </a:spcAft>
             </a:pPr>
             <a:r>
-              <a:rPr lang="en-US" sz="2800" dirty="0">
+              <a:rPr lang="en-US" sz="2400" dirty="0">
                 <a:latin typeface="+mj-lt"/>
               </a:rPr>
               <a:t>They wish to complete an implementation of the proposed solution for a single tenant to train the team and perfect the process</a:t>
@@ -15150,7 +15166,7 @@
               </a:spcAft>
               <a:buNone/>
             </a:pPr>
-            <a:endParaRPr lang="en-US" sz="2800" dirty="0">
+            <a:endParaRPr lang="en-US" sz="2400" dirty="0">
               <a:solidFill>
                 <a:schemeClr val="tx1"/>
               </a:solidFill>
@@ -15162,7 +15178,7 @@
                 <a:spcPts val="882"/>
               </a:spcAft>
             </a:pPr>
-            <a:endParaRPr lang="en-US" sz="3600" dirty="0">
+            <a:endParaRPr lang="en-US" sz="3200" dirty="0">
               <a:solidFill>
                 <a:schemeClr val="tx1"/>
               </a:solidFill>
@@ -15174,7 +15190,7 @@
                 <a:spcPts val="882"/>
               </a:spcAft>
             </a:pPr>
-            <a:endParaRPr lang="en-US" sz="3600" dirty="0">
+            <a:endParaRPr lang="en-US" sz="3200" dirty="0">
               <a:solidFill>
                 <a:schemeClr val="tx1"/>
               </a:solidFill>
@@ -18793,6 +18809,17 @@
               <a:t>The on-prem data backend is MongoDB; also running on a separate cluster of Linux servers.</a:t>
             </a:r>
           </a:p>
+          <a:p>
+            <a:pPr lvl="1" fontAlgn="base"/>
+            <a:r>
+              <a:rPr lang="en-US" sz="2800" b="1" dirty="0"/>
+              <a:t>There is relational data stored in PostgreSQL running on Linux servers.</a:t>
+            </a:r>
+          </a:p>
+          <a:p>
+            <a:pPr lvl="1" fontAlgn="base"/>
+            <a:endParaRPr lang="en-US" sz="2800" b="1" dirty="0"/>
+          </a:p>
         </p:txBody>
       </p:sp>
     </p:spTree>
@@ -18894,7 +18921,7 @@
         </p:spPr>
         <p:txBody>
           <a:bodyPr>
-            <a:normAutofit/>
+            <a:normAutofit lnSpcReduction="10000"/>
           </a:bodyPr>
           <a:lstStyle/>
           <a:p>
@@ -18904,10 +18931,10 @@
             </a:r>
           </a:p>
           <a:p>
-            <a:pPr lvl="2" fontAlgn="base"/>
+            <a:pPr lvl="2"/>
             <a:r>
               <a:rPr lang="en-US" sz="2400" b="1" dirty="0"/>
-              <a:t>A database in the MongoDB cluster with its own collections</a:t>
+              <a:t>Each tenant has a database in the MongoDB cluster with its own collections, and a database in PostgreSQL.</a:t>
             </a:r>
           </a:p>
           <a:p>

</xml_diff>

<commit_message>
add cognitive services to design session
</commit_message>
<xml_diff>
--- a/Whiteboard design session/WDS trainer presentation - Cloud-native applications.pptx
+++ b/Whiteboard design session/WDS trainer presentation - Cloud-native applications.pptx
@@ -6,7 +6,7 @@
     <p:sldMasterId id="2147483665" r:id="rId2"/>
   </p:sldMasterIdLst>
   <p:notesMasterIdLst>
-    <p:notesMasterId r:id="rId27"/>
+    <p:notesMasterId r:id="rId29"/>
   </p:notesMasterIdLst>
   <p:sldIdLst>
     <p:sldId id="300" r:id="rId3"/>
@@ -19,20 +19,22 @@
     <p:sldId id="327" r:id="rId10"/>
     <p:sldId id="328" r:id="rId11"/>
     <p:sldId id="326" r:id="rId12"/>
-    <p:sldId id="304" r:id="rId13"/>
-    <p:sldId id="305" r:id="rId14"/>
-    <p:sldId id="330" r:id="rId15"/>
-    <p:sldId id="320" r:id="rId16"/>
-    <p:sldId id="322" r:id="rId17"/>
-    <p:sldId id="321" r:id="rId18"/>
-    <p:sldId id="317" r:id="rId19"/>
-    <p:sldId id="316" r:id="rId20"/>
-    <p:sldId id="332" r:id="rId21"/>
-    <p:sldId id="319" r:id="rId22"/>
-    <p:sldId id="333" r:id="rId23"/>
-    <p:sldId id="334" r:id="rId24"/>
-    <p:sldId id="318" r:id="rId25"/>
-    <p:sldId id="315" r:id="rId26"/>
+    <p:sldId id="335" r:id="rId13"/>
+    <p:sldId id="304" r:id="rId14"/>
+    <p:sldId id="305" r:id="rId15"/>
+    <p:sldId id="330" r:id="rId16"/>
+    <p:sldId id="320" r:id="rId17"/>
+    <p:sldId id="322" r:id="rId18"/>
+    <p:sldId id="321" r:id="rId19"/>
+    <p:sldId id="317" r:id="rId20"/>
+    <p:sldId id="316" r:id="rId21"/>
+    <p:sldId id="332" r:id="rId22"/>
+    <p:sldId id="319" r:id="rId23"/>
+    <p:sldId id="333" r:id="rId24"/>
+    <p:sldId id="334" r:id="rId25"/>
+    <p:sldId id="336" r:id="rId26"/>
+    <p:sldId id="318" r:id="rId27"/>
+    <p:sldId id="315" r:id="rId28"/>
   </p:sldIdLst>
   <p:sldSz cx="12192000" cy="6858000"/>
   <p:notesSz cx="6858000" cy="9144000"/>
@@ -768,6 +770,14 @@
           <a:bodyPr/>
           <a:lstStyle/>
           <a:p>
+            <a:pPr lvl="0"/>
+            <a:endParaRPr lang="en-US" sz="1200" b="1" dirty="0">
+              <a:solidFill>
+                <a:schemeClr val="bg1"/>
+              </a:solidFill>
+            </a:endParaRPr>
+          </a:p>
+          <a:p>
             <a:endParaRPr lang="en-US" dirty="0"/>
           </a:p>
         </p:txBody>
@@ -798,7 +808,7 @@
     </p:spTree>
     <p:extLst>
       <p:ext uri="{BB962C8B-B14F-4D97-AF65-F5344CB8AC3E}">
-        <p14:creationId xmlns:p14="http://schemas.microsoft.com/office/powerpoint/2010/main" val="1669752691"/>
+        <p14:creationId xmlns:p14="http://schemas.microsoft.com/office/powerpoint/2010/main" val="2072721274"/>
       </p:ext>
     </p:extLst>
   </p:cSld>
@@ -882,7 +892,7 @@
     </p:spTree>
     <p:extLst>
       <p:ext uri="{BB962C8B-B14F-4D97-AF65-F5344CB8AC3E}">
-        <p14:creationId xmlns:p14="http://schemas.microsoft.com/office/powerpoint/2010/main" val="1267405105"/>
+        <p14:creationId xmlns:p14="http://schemas.microsoft.com/office/powerpoint/2010/main" val="1669752691"/>
       </p:ext>
     </p:extLst>
   </p:cSld>
@@ -966,7 +976,7 @@
     </p:spTree>
     <p:extLst>
       <p:ext uri="{BB962C8B-B14F-4D97-AF65-F5344CB8AC3E}">
-        <p14:creationId xmlns:p14="http://schemas.microsoft.com/office/powerpoint/2010/main" val="2732103551"/>
+        <p14:creationId xmlns:p14="http://schemas.microsoft.com/office/powerpoint/2010/main" val="1267405105"/>
       </p:ext>
     </p:extLst>
   </p:cSld>
@@ -1050,7 +1060,7 @@
     </p:spTree>
     <p:extLst>
       <p:ext uri="{BB962C8B-B14F-4D97-AF65-F5344CB8AC3E}">
-        <p14:creationId xmlns:p14="http://schemas.microsoft.com/office/powerpoint/2010/main" val="3229744285"/>
+        <p14:creationId xmlns:p14="http://schemas.microsoft.com/office/powerpoint/2010/main" val="2732103551"/>
       </p:ext>
     </p:extLst>
   </p:cSld>
@@ -1134,7 +1144,7 @@
     </p:spTree>
     <p:extLst>
       <p:ext uri="{BB962C8B-B14F-4D97-AF65-F5344CB8AC3E}">
-        <p14:creationId xmlns:p14="http://schemas.microsoft.com/office/powerpoint/2010/main" val="251902611"/>
+        <p14:creationId xmlns:p14="http://schemas.microsoft.com/office/powerpoint/2010/main" val="3229744285"/>
       </p:ext>
     </p:extLst>
   </p:cSld>
@@ -1218,7 +1228,7 @@
     </p:spTree>
     <p:extLst>
       <p:ext uri="{BB962C8B-B14F-4D97-AF65-F5344CB8AC3E}">
-        <p14:creationId xmlns:p14="http://schemas.microsoft.com/office/powerpoint/2010/main" val="1579283386"/>
+        <p14:creationId xmlns:p14="http://schemas.microsoft.com/office/powerpoint/2010/main" val="251902611"/>
       </p:ext>
     </p:extLst>
   </p:cSld>
@@ -1272,52 +1282,6 @@
           <a:bodyPr/>
           <a:lstStyle/>
           <a:p>
-            <a:pPr marL="0" marR="0" lvl="0" indent="0" algn="l" defTabSz="914400" rtl="0" eaLnBrk="1" fontAlgn="auto" latinLnBrk="0" hangingPunct="1">
-              <a:lnSpc>
-                <a:spcPct val="100000"/>
-              </a:lnSpc>
-              <a:spcBef>
-                <a:spcPts val="0"/>
-              </a:spcBef>
-              <a:spcAft>
-                <a:spcPts val="0"/>
-              </a:spcAft>
-              <a:buClrTx/>
-              <a:buSzTx/>
-              <a:buFontTx/>
-              <a:buNone/>
-              <a:tabLst/>
-              <a:defRPr/>
-            </a:pPr>
-            <a:r>
-              <a:rPr lang="en-US" sz="1200" dirty="0"/>
-              <a:t>The primary audience is the technical strategic decision-maker with influential solution architects, or lead technical personnel in development or operations. </a:t>
-            </a:r>
-          </a:p>
-          <a:p>
-            <a:pPr marL="0" marR="0" lvl="0" indent="0" algn="l" defTabSz="914400" rtl="0" eaLnBrk="1" fontAlgn="auto" latinLnBrk="0" hangingPunct="1">
-              <a:lnSpc>
-                <a:spcPct val="100000"/>
-              </a:lnSpc>
-              <a:spcBef>
-                <a:spcPts val="0"/>
-              </a:spcBef>
-              <a:spcAft>
-                <a:spcPts val="0"/>
-              </a:spcAft>
-              <a:buClrTx/>
-              <a:buSzTx/>
-              <a:buFontTx/>
-              <a:buNone/>
-              <a:tabLst/>
-              <a:defRPr/>
-            </a:pPr>
-            <a:r>
-              <a:rPr lang="en-US" sz="1200" dirty="0"/>
-              <a:t>For this example this could include the VP Engineering and his core team. </a:t>
-            </a:r>
-          </a:p>
-          <a:p>
             <a:endParaRPr lang="en-US" dirty="0"/>
           </a:p>
         </p:txBody>
@@ -1348,7 +1312,7 @@
     </p:spTree>
     <p:extLst>
       <p:ext uri="{BB962C8B-B14F-4D97-AF65-F5344CB8AC3E}">
-        <p14:creationId xmlns:p14="http://schemas.microsoft.com/office/powerpoint/2010/main" val="647674203"/>
+        <p14:creationId xmlns:p14="http://schemas.microsoft.com/office/powerpoint/2010/main" val="1579283386"/>
       </p:ext>
     </p:extLst>
   </p:cSld>
@@ -1402,6 +1366,52 @@
           <a:bodyPr/>
           <a:lstStyle/>
           <a:p>
+            <a:pPr marL="0" marR="0" lvl="0" indent="0" algn="l" defTabSz="914400" rtl="0" eaLnBrk="1" fontAlgn="auto" latinLnBrk="0" hangingPunct="1">
+              <a:lnSpc>
+                <a:spcPct val="100000"/>
+              </a:lnSpc>
+              <a:spcBef>
+                <a:spcPts val="0"/>
+              </a:spcBef>
+              <a:spcAft>
+                <a:spcPts val="0"/>
+              </a:spcAft>
+              <a:buClrTx/>
+              <a:buSzTx/>
+              <a:buFontTx/>
+              <a:buNone/>
+              <a:tabLst/>
+              <a:defRPr/>
+            </a:pPr>
+            <a:r>
+              <a:rPr lang="en-US" sz="1200" dirty="0"/>
+              <a:t>The primary audience is the technical strategic decision-maker with influential solution architects, or lead technical personnel in development or operations. </a:t>
+            </a:r>
+          </a:p>
+          <a:p>
+            <a:pPr marL="0" marR="0" lvl="0" indent="0" algn="l" defTabSz="914400" rtl="0" eaLnBrk="1" fontAlgn="auto" latinLnBrk="0" hangingPunct="1">
+              <a:lnSpc>
+                <a:spcPct val="100000"/>
+              </a:lnSpc>
+              <a:spcBef>
+                <a:spcPts val="0"/>
+              </a:spcBef>
+              <a:spcAft>
+                <a:spcPts val="0"/>
+              </a:spcAft>
+              <a:buClrTx/>
+              <a:buSzTx/>
+              <a:buFontTx/>
+              <a:buNone/>
+              <a:tabLst/>
+              <a:defRPr/>
+            </a:pPr>
+            <a:r>
+              <a:rPr lang="en-US" sz="1200" dirty="0"/>
+              <a:t>For this example this could include the VP Engineering and his core team. </a:t>
+            </a:r>
+          </a:p>
+          <a:p>
             <a:endParaRPr lang="en-US" dirty="0"/>
           </a:p>
         </p:txBody>
@@ -1432,7 +1442,7 @@
     </p:spTree>
     <p:extLst>
       <p:ext uri="{BB962C8B-B14F-4D97-AF65-F5344CB8AC3E}">
-        <p14:creationId xmlns:p14="http://schemas.microsoft.com/office/powerpoint/2010/main" val="4179281765"/>
+        <p14:creationId xmlns:p14="http://schemas.microsoft.com/office/powerpoint/2010/main" val="647674203"/>
       </p:ext>
     </p:extLst>
   </p:cSld>
@@ -1486,19 +1496,6 @@
           <a:bodyPr/>
           <a:lstStyle/>
           <a:p>
-            <a:r>
-              <a:rPr lang="en-US"/>
-              <a:t>Reference Links:</a:t>
-            </a:r>
-            <a:endParaRPr lang="en-US" dirty="0"/>
-          </a:p>
-          <a:p>
-            <a:r>
-              <a:rPr lang="en-US" dirty="0">
-                <a:hlinkClick r:id="rId3"/>
-              </a:rPr>
-              <a:t>https://docs.microsoft.com/en-us/azure/architecture/reference-architectures/microservices/aks</a:t>
-            </a:r>
             <a:endParaRPr lang="en-US" dirty="0"/>
           </a:p>
         </p:txBody>
@@ -1529,7 +1526,7 @@
     </p:spTree>
     <p:extLst>
       <p:ext uri="{BB962C8B-B14F-4D97-AF65-F5344CB8AC3E}">
-        <p14:creationId xmlns:p14="http://schemas.microsoft.com/office/powerpoint/2010/main" val="1793785314"/>
+        <p14:creationId xmlns:p14="http://schemas.microsoft.com/office/powerpoint/2010/main" val="4179281765"/>
       </p:ext>
     </p:extLst>
   </p:cSld>
@@ -1667,88 +1664,20 @@
           <a:bodyPr/>
           <a:lstStyle/>
           <a:p>
-            <a:pPr marL="0" marR="0" lvl="0" indent="0" algn="l" defTabSz="914400" rtl="0" eaLnBrk="1" fontAlgn="auto" latinLnBrk="0" hangingPunct="1">
-              <a:lnSpc>
-                <a:spcPct val="100000"/>
-              </a:lnSpc>
-              <a:spcBef>
-                <a:spcPts val="0"/>
-              </a:spcBef>
-              <a:spcAft>
-                <a:spcPts val="0"/>
-              </a:spcAft>
-              <a:buClrTx/>
-              <a:buSzTx/>
-              <a:buFontTx/>
-              <a:buNone/>
-              <a:tabLst/>
-              <a:defRPr/>
-            </a:pPr>
-            <a:r>
-              <a:rPr lang="en-US" sz="1200" kern="1200" dirty="0">
-                <a:solidFill>
-                  <a:schemeClr val="tx1"/>
-                </a:solidFill>
-                <a:effectLst/>
-                <a:latin typeface="+mn-lt"/>
-                <a:ea typeface="+mn-ea"/>
-                <a:cs typeface="+mn-cs"/>
+            <a:r>
+              <a:rPr lang="en-US"/>
+              <a:t>Reference Links:</a:t>
+            </a:r>
+            <a:endParaRPr lang="en-US" dirty="0"/>
+          </a:p>
+          <a:p>
+            <a:r>
+              <a:rPr lang="en-US" dirty="0">
+                <a:hlinkClick r:id="rId3"/>
               </a:rPr>
-              <a:t>The easiest way to move to containers on Azure is to deploy containers to the Linux variant of App Service. However, this option does not provide a full-featured container orchestration platform with highly customizable load balancing, dynamic service discovery, and a holistic approach to container monitoring.</a:t>
-            </a:r>
-          </a:p>
-          <a:p>
-            <a:endParaRPr lang="en-US" sz="1200" kern="1200" dirty="0">
-              <a:solidFill>
-                <a:schemeClr val="tx1"/>
-              </a:solidFill>
-              <a:effectLst/>
-              <a:latin typeface="+mn-lt"/>
-              <a:ea typeface="+mn-ea"/>
-              <a:cs typeface="+mn-cs"/>
-            </a:endParaRPr>
-          </a:p>
-          <a:p>
-            <a:r>
-              <a:rPr lang="en-US" sz="1200" kern="1200" dirty="0">
-                <a:solidFill>
-                  <a:schemeClr val="tx1"/>
-                </a:solidFill>
-                <a:effectLst/>
-                <a:latin typeface="+mn-lt"/>
-                <a:ea typeface="+mn-ea"/>
-                <a:cs typeface="+mn-cs"/>
-              </a:rPr>
-              <a:t>Azure Container Instances also provide a simple way to manage individual containers without management tooling providing a way to do on demand scaling for workloads that need that flexibility.</a:t>
-            </a:r>
-          </a:p>
-          <a:p>
-            <a:r>
-              <a:rPr lang="en-US" sz="1200" kern="1200" dirty="0">
-                <a:solidFill>
-                  <a:schemeClr val="tx1"/>
-                </a:solidFill>
-                <a:effectLst/>
-                <a:latin typeface="+mn-lt"/>
-                <a:ea typeface="+mn-ea"/>
-                <a:cs typeface="+mn-cs"/>
-              </a:rPr>
-              <a:t> </a:t>
-            </a:r>
-          </a:p>
-          <a:p>
-            <a:r>
-              <a:rPr lang="en-US" sz="1200" kern="1200" dirty="0">
-                <a:solidFill>
-                  <a:schemeClr val="tx1"/>
-                </a:solidFill>
-                <a:effectLst/>
-                <a:latin typeface="+mn-lt"/>
-                <a:ea typeface="+mn-ea"/>
-                <a:cs typeface="+mn-cs"/>
-              </a:rPr>
-              <a:t>Ideally, Azure Kubernetes Service (AKS) will provide a fully managed service with the full set of orchestration and management tools. Working with AKS is the best choice to enable migration to AKS while still benefiting from a complete container orchestration experience to support the growth trajectory of the solution.</a:t>
-            </a:r>
+              <a:t>https://docs.microsoft.com/en-us/azure/architecture/reference-architectures/microservices/aks</a:t>
+            </a:r>
+            <a:endParaRPr lang="en-US" dirty="0"/>
           </a:p>
         </p:txBody>
       </p:sp>
@@ -1778,7 +1707,7 @@
     </p:spTree>
     <p:extLst>
       <p:ext uri="{BB962C8B-B14F-4D97-AF65-F5344CB8AC3E}">
-        <p14:creationId xmlns:p14="http://schemas.microsoft.com/office/powerpoint/2010/main" val="4115832635"/>
+        <p14:creationId xmlns:p14="http://schemas.microsoft.com/office/powerpoint/2010/main" val="1793785314"/>
       </p:ext>
     </p:extLst>
   </p:cSld>
@@ -1832,6 +1761,23 @@
           <a:bodyPr/>
           <a:lstStyle/>
           <a:p>
+            <a:pPr marL="0" marR="0" lvl="0" indent="0" algn="l" defTabSz="914400" rtl="0" eaLnBrk="1" fontAlgn="auto" latinLnBrk="0" hangingPunct="1">
+              <a:lnSpc>
+                <a:spcPct val="100000"/>
+              </a:lnSpc>
+              <a:spcBef>
+                <a:spcPts val="0"/>
+              </a:spcBef>
+              <a:spcAft>
+                <a:spcPts val="0"/>
+              </a:spcAft>
+              <a:buClrTx/>
+              <a:buSzTx/>
+              <a:buFontTx/>
+              <a:buNone/>
+              <a:tabLst/>
+              <a:defRPr/>
+            </a:pPr>
             <a:r>
               <a:rPr lang="en-US" sz="1200" kern="1200" dirty="0">
                 <a:solidFill>
@@ -1842,7 +1788,7 @@
                 <a:ea typeface="+mn-ea"/>
                 <a:cs typeface="+mn-cs"/>
               </a:rPr>
-              <a:t>The best of all worlds is to go with a managed orchestration platform like AKS – native to Azure. It reduces the cost and management overhead of the cluster, while still providing a solution that supports growth, scale, and native management tooling. </a:t>
+              <a:t>The easiest way to move to containers on Azure is to deploy containers to the Linux variant of App Service. However, this option does not provide a full-featured container orchestration platform with highly customizable load balancing, dynamic service discovery, and a holistic approach to container monitoring.</a:t>
             </a:r>
           </a:p>
           <a:p>
@@ -1867,11 +1813,10 @@
                 <a:ea typeface="+mn-ea"/>
                 <a:cs typeface="+mn-cs"/>
               </a:rPr>
-              <a:t>With Kubernetes, you will have additional features at your fingertips beyond the pure Docker approach including:</a:t>
-            </a:r>
-          </a:p>
-          <a:p>
-            <a:pPr lvl="0" fontAlgn="base"/>
+              <a:t>Azure Container Instances also provide a simple way to manage individual containers without management tooling providing a way to do on demand scaling for workloads that need that flexibility.</a:t>
+            </a:r>
+          </a:p>
+          <a:p>
             <a:r>
               <a:rPr lang="en-US" sz="1200" kern="1200" dirty="0">
                 <a:solidFill>
@@ -1882,20 +1827,10 @@
                 <a:ea typeface="+mn-ea"/>
                 <a:cs typeface="+mn-cs"/>
               </a:rPr>
-              <a:t>The Kubernetes management dashboard which </a:t>
-            </a:r>
-            <a:r>
-              <a:rPr lang="en-US" sz="1200" kern="1200">
-                <a:solidFill>
-                  <a:schemeClr val="tx1"/>
-                </a:solidFill>
-                <a:effectLst/>
-                <a:latin typeface="+mn-lt"/>
-                <a:ea typeface="+mn-ea"/>
-                <a:cs typeface="+mn-cs"/>
-              </a:rPr>
-              <a:t>includes the web </a:t>
-            </a:r>
+              <a:t> </a:t>
+            </a:r>
+          </a:p>
+          <a:p>
             <a:r>
               <a:rPr lang="en-US" sz="1200" kern="1200" dirty="0">
                 <a:solidFill>
@@ -1906,37 +1841,7 @@
                 <a:ea typeface="+mn-ea"/>
                 <a:cs typeface="+mn-cs"/>
               </a:rPr>
-              <a:t>interface and remote APIs for managing, running, and scaling containers, including CICD integration options.</a:t>
-            </a:r>
-          </a:p>
-          <a:p>
-            <a:pPr lvl="0" fontAlgn="base"/>
-            <a:r>
-              <a:rPr lang="en-US" sz="1200" kern="1200" dirty="0">
-                <a:solidFill>
-                  <a:schemeClr val="tx1"/>
-                </a:solidFill>
-                <a:effectLst/>
-                <a:latin typeface="+mn-lt"/>
-                <a:ea typeface="+mn-ea"/>
-                <a:cs typeface="+mn-cs"/>
-              </a:rPr>
-              <a:t>The kubectl command line tool for engaging remote Kubernetes APIs and assisting with automation. </a:t>
-            </a:r>
-          </a:p>
-          <a:p>
-            <a:pPr lvl="0" fontAlgn="base"/>
-            <a:r>
-              <a:rPr lang="en-US" sz="1200" kern="1200" dirty="0">
-                <a:solidFill>
-                  <a:schemeClr val="tx1"/>
-                </a:solidFill>
-                <a:effectLst/>
-                <a:latin typeface="+mn-lt"/>
-                <a:ea typeface="+mn-ea"/>
-                <a:cs typeface="+mn-cs"/>
-              </a:rPr>
-              <a:t>Built-in dynamic service discovery simplifying the deployment of new container instances to a load balanced environment. </a:t>
+              <a:t>Ideally, Azure Kubernetes Service (AKS) will provide a fully managed service with the full set of orchestration and management tools. Working with AKS is the best choice to enable migration to AKS while still benefiting from a complete container orchestration experience to support the growth trajectory of the solution.</a:t>
             </a:r>
           </a:p>
         </p:txBody>
@@ -1967,7 +1872,7 @@
     </p:spTree>
     <p:extLst>
       <p:ext uri="{BB962C8B-B14F-4D97-AF65-F5344CB8AC3E}">
-        <p14:creationId xmlns:p14="http://schemas.microsoft.com/office/powerpoint/2010/main" val="1806888693"/>
+        <p14:creationId xmlns:p14="http://schemas.microsoft.com/office/powerpoint/2010/main" val="4115832635"/>
       </p:ext>
     </p:extLst>
   </p:cSld>
@@ -2021,7 +1926,112 @@
           <a:bodyPr/>
           <a:lstStyle/>
           <a:p>
-            <a:endParaRPr lang="en-US" dirty="0"/>
+            <a:r>
+              <a:rPr lang="en-US" sz="1200" kern="1200" dirty="0">
+                <a:solidFill>
+                  <a:schemeClr val="tx1"/>
+                </a:solidFill>
+                <a:effectLst/>
+                <a:latin typeface="+mn-lt"/>
+                <a:ea typeface="+mn-ea"/>
+                <a:cs typeface="+mn-cs"/>
+              </a:rPr>
+              <a:t>The best of all worlds is to go with a managed orchestration platform like AKS – native to Azure. It reduces the cost and management overhead of the cluster, while still providing a solution that supports growth, scale, and native management tooling. </a:t>
+            </a:r>
+          </a:p>
+          <a:p>
+            <a:endParaRPr lang="en-US" sz="1200" kern="1200" dirty="0">
+              <a:solidFill>
+                <a:schemeClr val="tx1"/>
+              </a:solidFill>
+              <a:effectLst/>
+              <a:latin typeface="+mn-lt"/>
+              <a:ea typeface="+mn-ea"/>
+              <a:cs typeface="+mn-cs"/>
+            </a:endParaRPr>
+          </a:p>
+          <a:p>
+            <a:r>
+              <a:rPr lang="en-US" sz="1200" kern="1200" dirty="0">
+                <a:solidFill>
+                  <a:schemeClr val="tx1"/>
+                </a:solidFill>
+                <a:effectLst/>
+                <a:latin typeface="+mn-lt"/>
+                <a:ea typeface="+mn-ea"/>
+                <a:cs typeface="+mn-cs"/>
+              </a:rPr>
+              <a:t>With Kubernetes, you will have additional features at your fingertips beyond the pure Docker approach including:</a:t>
+            </a:r>
+          </a:p>
+          <a:p>
+            <a:pPr lvl="0" fontAlgn="base"/>
+            <a:r>
+              <a:rPr lang="en-US" sz="1200" kern="1200" dirty="0">
+                <a:solidFill>
+                  <a:schemeClr val="tx1"/>
+                </a:solidFill>
+                <a:effectLst/>
+                <a:latin typeface="+mn-lt"/>
+                <a:ea typeface="+mn-ea"/>
+                <a:cs typeface="+mn-cs"/>
+              </a:rPr>
+              <a:t>The Kubernetes management dashboard which </a:t>
+            </a:r>
+            <a:r>
+              <a:rPr lang="en-US" sz="1200" kern="1200">
+                <a:solidFill>
+                  <a:schemeClr val="tx1"/>
+                </a:solidFill>
+                <a:effectLst/>
+                <a:latin typeface="+mn-lt"/>
+                <a:ea typeface="+mn-ea"/>
+                <a:cs typeface="+mn-cs"/>
+              </a:rPr>
+              <a:t>includes the web </a:t>
+            </a:r>
+            <a:r>
+              <a:rPr lang="en-US" sz="1200" kern="1200" dirty="0">
+                <a:solidFill>
+                  <a:schemeClr val="tx1"/>
+                </a:solidFill>
+                <a:effectLst/>
+                <a:latin typeface="+mn-lt"/>
+                <a:ea typeface="+mn-ea"/>
+                <a:cs typeface="+mn-cs"/>
+              </a:rPr>
+              <a:t>interface and remote APIs for managing, running, and scaling containers, including CICD integration options.</a:t>
+            </a:r>
+          </a:p>
+          <a:p>
+            <a:pPr lvl="0" fontAlgn="base"/>
+            <a:r>
+              <a:rPr lang="en-US" sz="1200" kern="1200" dirty="0">
+                <a:solidFill>
+                  <a:schemeClr val="tx1"/>
+                </a:solidFill>
+                <a:effectLst/>
+                <a:latin typeface="+mn-lt"/>
+                <a:ea typeface="+mn-ea"/>
+                <a:cs typeface="+mn-cs"/>
+              </a:rPr>
+              <a:t>The kubectl command line tool for engaging remote Kubernetes APIs and assisting with automation. </a:t>
+            </a:r>
+          </a:p>
+          <a:p>
+            <a:pPr lvl="0" fontAlgn="base"/>
+            <a:r>
+              <a:rPr lang="en-US" sz="1200" kern="1200" dirty="0">
+                <a:solidFill>
+                  <a:schemeClr val="tx1"/>
+                </a:solidFill>
+                <a:effectLst/>
+                <a:latin typeface="+mn-lt"/>
+                <a:ea typeface="+mn-ea"/>
+                <a:cs typeface="+mn-cs"/>
+              </a:rPr>
+              <a:t>Built-in dynamic service discovery simplifying the deployment of new container instances to a load balanced environment. </a:t>
+            </a:r>
           </a:p>
         </p:txBody>
       </p:sp>
@@ -2042,7 +2052,91 @@
           <a:p>
             <a:fld id="{0998D5BB-B127-481F-BC0A-2F77C576BB34}" type="slidenum">
               <a:rPr lang="en-US" smtClean="0"/>
-              <a:t>23</a:t>
+              <a:t>22</a:t>
+            </a:fld>
+            <a:endParaRPr lang="en-US" dirty="0"/>
+          </a:p>
+        </p:txBody>
+      </p:sp>
+    </p:spTree>
+    <p:extLst>
+      <p:ext uri="{BB962C8B-B14F-4D97-AF65-F5344CB8AC3E}">
+        <p14:creationId xmlns:p14="http://schemas.microsoft.com/office/powerpoint/2010/main" val="1806888693"/>
+      </p:ext>
+    </p:extLst>
+  </p:cSld>
+  <p:clrMapOvr>
+    <a:masterClrMapping/>
+  </p:clrMapOvr>
+</p:notes>
+</file>
+
+<file path=ppt/notesSlides/notesSlide23.xml><?xml version="1.0" encoding="utf-8"?>
+<p:notes xmlns:a="http://schemas.openxmlformats.org/drawingml/2006/main" xmlns:r="http://schemas.openxmlformats.org/officeDocument/2006/relationships" xmlns:p="http://schemas.openxmlformats.org/presentationml/2006/main">
+  <p:cSld>
+    <p:spTree>
+      <p:nvGrpSpPr>
+        <p:cNvPr id="1" name=""/>
+        <p:cNvGrpSpPr/>
+        <p:nvPr/>
+      </p:nvGrpSpPr>
+      <p:grpSpPr>
+        <a:xfrm>
+          <a:off x="0" y="0"/>
+          <a:ext cx="0" cy="0"/>
+          <a:chOff x="0" y="0"/>
+          <a:chExt cx="0" cy="0"/>
+        </a:xfrm>
+      </p:grpSpPr>
+      <p:sp>
+        <p:nvSpPr>
+          <p:cNvPr id="2" name="Slide Image Placeholder 1"/>
+          <p:cNvSpPr>
+            <a:spLocks noGrp="1" noRot="1" noChangeAspect="1"/>
+          </p:cNvSpPr>
+          <p:nvPr>
+            <p:ph type="sldImg"/>
+          </p:nvPr>
+        </p:nvSpPr>
+        <p:spPr/>
+      </p:sp>
+      <p:sp>
+        <p:nvSpPr>
+          <p:cNvPr id="3" name="Notes Placeholder 2"/>
+          <p:cNvSpPr>
+            <a:spLocks noGrp="1"/>
+          </p:cNvSpPr>
+          <p:nvPr>
+            <p:ph type="body" idx="1"/>
+          </p:nvPr>
+        </p:nvSpPr>
+        <p:spPr/>
+        <p:txBody>
+          <a:bodyPr/>
+          <a:lstStyle/>
+          <a:p>
+            <a:endParaRPr lang="en-US" dirty="0"/>
+          </a:p>
+        </p:txBody>
+      </p:sp>
+      <p:sp>
+        <p:nvSpPr>
+          <p:cNvPr id="4" name="Slide Number Placeholder 3"/>
+          <p:cNvSpPr>
+            <a:spLocks noGrp="1"/>
+          </p:cNvSpPr>
+          <p:nvPr>
+            <p:ph type="sldNum" sz="quarter" idx="10"/>
+          </p:nvPr>
+        </p:nvSpPr>
+        <p:spPr/>
+        <p:txBody>
+          <a:bodyPr/>
+          <a:lstStyle/>
+          <a:p>
+            <a:fld id="{0998D5BB-B127-481F-BC0A-2F77C576BB34}" type="slidenum">
+              <a:rPr lang="en-US" smtClean="0"/>
+              <a:t>25</a:t>
             </a:fld>
             <a:endParaRPr lang="en-US" dirty="0"/>
           </a:p>
@@ -2061,7 +2155,7 @@
 </p:notes>
 </file>
 
-<file path=ppt/notesSlides/notesSlide23.xml><?xml version="1.0" encoding="utf-8"?>
+<file path=ppt/notesSlides/notesSlide24.xml><?xml version="1.0" encoding="utf-8"?>
 <p:notes xmlns:a="http://schemas.openxmlformats.org/drawingml/2006/main" xmlns:r="http://schemas.openxmlformats.org/officeDocument/2006/relationships" xmlns:p="http://schemas.openxmlformats.org/presentationml/2006/main">
   <p:cSld>
     <p:spTree>
@@ -2200,7 +2294,7 @@
                 </a:solidFill>
               </a:rPr>
               <a:pPr/>
-              <a:t>24</a:t>
+              <a:t>26</a:t>
             </a:fld>
             <a:endParaRPr lang="en-US" dirty="0">
               <a:solidFill>
@@ -15025,7 +15119,7 @@
               </a:spcAft>
             </a:pPr>
             <a:r>
-              <a:rPr lang="en-US" sz="2400" dirty="0">
+              <a:rPr lang="en-US" sz="3000" dirty="0">
                 <a:solidFill>
                   <a:schemeClr val="tx1"/>
                 </a:solidFill>
@@ -15041,7 +15135,7 @@
               </a:spcAft>
             </a:pPr>
             <a:r>
-              <a:rPr lang="en-US" sz="2400" dirty="0">
+              <a:rPr lang="en-US" sz="3000" dirty="0">
                 <a:solidFill>
                   <a:schemeClr val="tx1"/>
                 </a:solidFill>
@@ -15057,7 +15151,7 @@
               </a:spcAft>
             </a:pPr>
             <a:r>
-              <a:rPr lang="en-US" sz="2400" dirty="0">
+              <a:rPr lang="en-US" sz="3000" dirty="0">
                 <a:solidFill>
                   <a:schemeClr val="tx1"/>
                 </a:solidFill>
@@ -15073,7 +15167,7 @@
               </a:spcAft>
             </a:pPr>
             <a:r>
-              <a:rPr lang="en-US" sz="2400" dirty="0">
+              <a:rPr lang="en-US" sz="3000" dirty="0">
                 <a:solidFill>
                   <a:schemeClr val="tx1"/>
                 </a:solidFill>
@@ -15089,7 +15183,7 @@
               </a:spcAft>
             </a:pPr>
             <a:r>
-              <a:rPr lang="en-US" sz="2400" dirty="0">
+              <a:rPr lang="en-US" sz="3000" dirty="0">
                 <a:solidFill>
                   <a:schemeClr val="tx1"/>
                 </a:solidFill>
@@ -15105,11 +15199,10 @@
               </a:spcAft>
             </a:pPr>
             <a:r>
-              <a:rPr lang="en-US" sz="2400" dirty="0">
+              <a:rPr lang="en-US" sz="3000" dirty="0">
                 <a:solidFill>
                   <a:schemeClr val="tx1"/>
                 </a:solidFill>
-                <a:latin typeface="+mj-lt"/>
               </a:rPr>
               <a:t>Continue to use Git repositories for source control</a:t>
             </a:r>
@@ -15121,11 +15214,10 @@
               </a:spcAft>
             </a:pPr>
             <a:r>
-              <a:rPr lang="en-US" sz="2400" dirty="0">
+              <a:rPr lang="en-US" sz="3000" dirty="0">
                 <a:solidFill>
                   <a:schemeClr val="tx1"/>
                 </a:solidFill>
-                <a:latin typeface="+mj-lt"/>
               </a:rPr>
               <a:t>Look at GitHub Actions as the CICD tool of choice</a:t>
             </a:r>
@@ -15136,15 +15228,11 @@
                 <a:spcPts val="882"/>
               </a:spcAft>
             </a:pPr>
-            <a:r>
-              <a:rPr lang="en-US" sz="2400" dirty="0">
-                <a:solidFill>
-                  <a:schemeClr val="tx1"/>
-                </a:solidFill>
-                <a:latin typeface="+mj-lt"/>
-              </a:rPr>
-              <a:t>Use tools for deployment, CICD integration, container scheduling, orchestration, monitoring, and alerts</a:t>
-            </a:r>
+            <a:endParaRPr lang="en-US" sz="3000" dirty="0">
+              <a:solidFill>
+                <a:schemeClr val="tx1"/>
+              </a:solidFill>
+            </a:endParaRPr>
           </a:p>
           <a:p>
             <a:pPr lvl="1">
@@ -15152,24 +15240,11 @@
                 <a:spcPts val="882"/>
               </a:spcAft>
             </a:pPr>
-            <a:r>
-              <a:rPr lang="en-US" sz="2400" dirty="0">
-                <a:latin typeface="+mj-lt"/>
-              </a:rPr>
-              <a:t>They wish to complete an implementation of the proposed solution for a single tenant to train the team and perfect the process</a:t>
-            </a:r>
-          </a:p>
-          <a:p>
-            <a:pPr marL="236546" lvl="1" indent="0">
-              <a:spcAft>
-                <a:spcPts val="882"/>
-              </a:spcAft>
-              <a:buNone/>
-            </a:pPr>
-            <a:endParaRPr lang="en-US" sz="2400" dirty="0">
+            <a:endParaRPr lang="en-US" sz="3000" dirty="0">
               <a:solidFill>
                 <a:schemeClr val="tx1"/>
               </a:solidFill>
+              <a:latin typeface="+mj-lt"/>
             </a:endParaRPr>
           </a:p>
           <a:p>
@@ -15178,19 +15253,7 @@
                 <a:spcPts val="882"/>
               </a:spcAft>
             </a:pPr>
-            <a:endParaRPr lang="en-US" sz="3200" dirty="0">
-              <a:solidFill>
-                <a:schemeClr val="tx1"/>
-              </a:solidFill>
-            </a:endParaRPr>
-          </a:p>
-          <a:p>
-            <a:pPr>
-              <a:spcAft>
-                <a:spcPts val="882"/>
-              </a:spcAft>
-            </a:pPr>
-            <a:endParaRPr lang="en-US" sz="3200" dirty="0">
+            <a:endParaRPr lang="en-US" sz="3000" dirty="0">
               <a:solidFill>
                 <a:schemeClr val="tx1"/>
               </a:solidFill>
@@ -15263,6 +15326,211 @@
 </file>
 
 <file path=ppt/slides/slide11.xml><?xml version="1.0" encoding="utf-8"?>
+<p:sld xmlns:a="http://schemas.openxmlformats.org/drawingml/2006/main" xmlns:r="http://schemas.openxmlformats.org/officeDocument/2006/relationships" xmlns:p="http://schemas.openxmlformats.org/presentationml/2006/main">
+  <p:cSld>
+    <p:spTree>
+      <p:nvGrpSpPr>
+        <p:cNvPr id="1" name=""/>
+        <p:cNvGrpSpPr/>
+        <p:nvPr/>
+      </p:nvGrpSpPr>
+      <p:grpSpPr>
+        <a:xfrm>
+          <a:off x="0" y="0"/>
+          <a:ext cx="0" cy="0"/>
+          <a:chOff x="0" y="0"/>
+          <a:chExt cx="0" cy="0"/>
+        </a:xfrm>
+      </p:grpSpPr>
+      <p:sp>
+        <p:nvSpPr>
+          <p:cNvPr id="3" name="Content Placeholder 2"/>
+          <p:cNvSpPr>
+            <a:spLocks noGrp="1"/>
+          </p:cNvSpPr>
+          <p:nvPr>
+            <p:ph type="body" sz="quarter" idx="10"/>
+          </p:nvPr>
+        </p:nvSpPr>
+        <p:spPr>
+          <a:xfrm>
+            <a:off x="269240" y="1104116"/>
+            <a:ext cx="11653523" cy="5613676"/>
+          </a:xfrm>
+        </p:spPr>
+        <p:txBody>
+          <a:bodyPr>
+            <a:noAutofit/>
+          </a:bodyPr>
+          <a:lstStyle/>
+          <a:p>
+            <a:pPr lvl="1">
+              <a:spcAft>
+                <a:spcPts val="882"/>
+              </a:spcAft>
+            </a:pPr>
+            <a:r>
+              <a:rPr lang="en-US" sz="3000" dirty="0">
+                <a:solidFill>
+                  <a:schemeClr val="tx1"/>
+                </a:solidFill>
+              </a:rPr>
+              <a:t>Use tools for deployment, CICD integration, container scheduling, orchestration, monitoring, and alerts</a:t>
+            </a:r>
+          </a:p>
+          <a:p>
+            <a:pPr lvl="1">
+              <a:spcAft>
+                <a:spcPts val="882"/>
+              </a:spcAft>
+            </a:pPr>
+            <a:r>
+              <a:rPr lang="en-US" sz="3000" dirty="0">
+                <a:solidFill>
+                  <a:schemeClr val="tx1"/>
+                </a:solidFill>
+              </a:rPr>
+              <a:t>They wish to complete an implementation of the proposed solution for a single tenant to train the team and perfect the process</a:t>
+            </a:r>
+          </a:p>
+          <a:p>
+            <a:pPr lvl="1">
+              <a:spcAft>
+                <a:spcPts val="882"/>
+              </a:spcAft>
+            </a:pPr>
+            <a:r>
+              <a:rPr lang="en-US" sz="3000" dirty="0">
+                <a:solidFill>
+                  <a:schemeClr val="tx1"/>
+                </a:solidFill>
+              </a:rPr>
+              <a:t>Enhance attendee session feedback with AI to prevent inappropriate content from being posted, and real-time language translation to better accommodate growing worldwide conference attendance.</a:t>
+            </a:r>
+          </a:p>
+          <a:p>
+            <a:pPr lvl="1">
+              <a:spcAft>
+                <a:spcPts val="882"/>
+              </a:spcAft>
+            </a:pPr>
+            <a:endParaRPr lang="en-US" sz="3000" dirty="0">
+              <a:latin typeface="+mj-lt"/>
+            </a:endParaRPr>
+          </a:p>
+          <a:p>
+            <a:pPr marL="236546" lvl="1" indent="0">
+              <a:spcAft>
+                <a:spcPts val="882"/>
+              </a:spcAft>
+              <a:buNone/>
+            </a:pPr>
+            <a:endParaRPr lang="en-US" sz="3000" dirty="0">
+              <a:solidFill>
+                <a:schemeClr val="tx1"/>
+              </a:solidFill>
+            </a:endParaRPr>
+          </a:p>
+          <a:p>
+            <a:pPr>
+              <a:spcAft>
+                <a:spcPts val="882"/>
+              </a:spcAft>
+            </a:pPr>
+            <a:endParaRPr lang="en-US" sz="3000" dirty="0">
+              <a:solidFill>
+                <a:schemeClr val="tx1"/>
+              </a:solidFill>
+            </a:endParaRPr>
+          </a:p>
+          <a:p>
+            <a:pPr>
+              <a:spcAft>
+                <a:spcPts val="882"/>
+              </a:spcAft>
+            </a:pPr>
+            <a:endParaRPr lang="en-US" sz="3000" dirty="0">
+              <a:solidFill>
+                <a:schemeClr val="tx1"/>
+              </a:solidFill>
+            </a:endParaRPr>
+          </a:p>
+        </p:txBody>
+      </p:sp>
+      <p:sp>
+        <p:nvSpPr>
+          <p:cNvPr id="2" name="Title 1"/>
+          <p:cNvSpPr>
+            <a:spLocks noGrp="1"/>
+          </p:cNvSpPr>
+          <p:nvPr>
+            <p:ph type="title"/>
+          </p:nvPr>
+        </p:nvSpPr>
+        <p:spPr/>
+        <p:txBody>
+          <a:bodyPr>
+            <a:normAutofit fontScale="90000"/>
+          </a:bodyPr>
+          <a:lstStyle/>
+          <a:p>
+            <a:r>
+              <a:rPr lang="en-US" sz="4900" dirty="0">
+                <a:solidFill>
+                  <a:schemeClr val="tx1"/>
+                </a:solidFill>
+                <a:cs typeface="Segoe UI" panose="020B0502040204020203" pitchFamily="34" charset="0"/>
+              </a:rPr>
+              <a:t>Customer needs </a:t>
+            </a:r>
+            <a:r>
+              <a:rPr lang="en-US" sz="4900" i="1" dirty="0">
+                <a:solidFill>
+                  <a:schemeClr val="tx1"/>
+                </a:solidFill>
+                <a:cs typeface="Segoe UI" panose="020B0502040204020203" pitchFamily="34" charset="0"/>
+              </a:rPr>
+              <a:t>(continued)</a:t>
+            </a:r>
+            <a:br>
+              <a:rPr lang="en-US" i="1" dirty="0">
+                <a:solidFill>
+                  <a:schemeClr val="tx1"/>
+                </a:solidFill>
+                <a:latin typeface="Segoe UI" panose="020B0502040204020203" pitchFamily="34" charset="0"/>
+              </a:rPr>
+            </a:br>
+            <a:endParaRPr lang="en-US" sz="3236" i="1" dirty="0">
+              <a:solidFill>
+                <a:schemeClr val="tx1"/>
+              </a:solidFill>
+              <a:latin typeface="Segoe UI" panose="020B0502040204020203" pitchFamily="34" charset="0"/>
+            </a:endParaRPr>
+          </a:p>
+        </p:txBody>
+      </p:sp>
+    </p:spTree>
+    <p:extLst>
+      <p:ext uri="{BB962C8B-B14F-4D97-AF65-F5344CB8AC3E}">
+        <p14:creationId xmlns:p14="http://schemas.microsoft.com/office/powerpoint/2010/main" val="3705190989"/>
+      </p:ext>
+    </p:extLst>
+  </p:cSld>
+  <p:clrMapOvr>
+    <a:masterClrMapping/>
+  </p:clrMapOvr>
+  <mc:AlternateContent xmlns:mc="http://schemas.openxmlformats.org/markup-compatibility/2006">
+    <mc:Choice xmlns:p14="http://schemas.microsoft.com/office/powerpoint/2010/main" Requires="p14">
+      <p:transition p14:dur="0"/>
+    </mc:Choice>
+    <mc:Fallback>
+      <p:transition/>
+    </mc:Fallback>
+  </mc:AlternateContent>
+</p:sld>
+</file>
+
+<file path=ppt/slides/slide12.xml><?xml version="1.0" encoding="utf-8"?>
 <p:sld xmlns:a="http://schemas.openxmlformats.org/drawingml/2006/main" xmlns:r="http://schemas.openxmlformats.org/officeDocument/2006/relationships" xmlns:p="http://schemas.openxmlformats.org/presentationml/2006/main">
   <p:cSld>
     <p:spTree>
@@ -15435,7 +15703,7 @@
 </p:sld>
 </file>
 
-<file path=ppt/slides/slide12.xml><?xml version="1.0" encoding="utf-8"?>
+<file path=ppt/slides/slide13.xml><?xml version="1.0" encoding="utf-8"?>
 <p:sld xmlns:a="http://schemas.openxmlformats.org/drawingml/2006/main" xmlns:r="http://schemas.openxmlformats.org/officeDocument/2006/relationships" xmlns:p="http://schemas.openxmlformats.org/presentationml/2006/main">
   <p:cSld>
     <p:spTree>
@@ -15583,7 +15851,7 @@
 </p:sld>
 </file>
 
-<file path=ppt/slides/slide13.xml><?xml version="1.0" encoding="utf-8"?>
+<file path=ppt/slides/slide14.xml><?xml version="1.0" encoding="utf-8"?>
 <p:sld xmlns:a="http://schemas.openxmlformats.org/drawingml/2006/main" xmlns:r="http://schemas.openxmlformats.org/officeDocument/2006/relationships" xmlns:p="http://schemas.openxmlformats.org/presentationml/2006/main">
   <p:cSld>
     <p:spTree>
@@ -15726,7 +15994,7 @@
 </p:sld>
 </file>
 
-<file path=ppt/slides/slide14.xml><?xml version="1.0" encoding="utf-8"?>
+<file path=ppt/slides/slide15.xml><?xml version="1.0" encoding="utf-8"?>
 <p:sld xmlns:a="http://schemas.openxmlformats.org/drawingml/2006/main" xmlns:r="http://schemas.openxmlformats.org/officeDocument/2006/relationships" xmlns:p="http://schemas.openxmlformats.org/presentationml/2006/main">
   <p:cSld>
     <p:spTree>
@@ -16254,310 +16522,6 @@
 </p:sld>
 </file>
 
-<file path=ppt/slides/slide15.xml><?xml version="1.0" encoding="utf-8"?>
-<p:sld xmlns:a="http://schemas.openxmlformats.org/drawingml/2006/main" xmlns:r="http://schemas.openxmlformats.org/officeDocument/2006/relationships" xmlns:p="http://schemas.openxmlformats.org/presentationml/2006/main">
-  <p:cSld>
-    <p:spTree>
-      <p:nvGrpSpPr>
-        <p:cNvPr id="1" name=""/>
-        <p:cNvGrpSpPr/>
-        <p:nvPr/>
-      </p:nvGrpSpPr>
-      <p:grpSpPr>
-        <a:xfrm>
-          <a:off x="0" y="0"/>
-          <a:ext cx="0" cy="0"/>
-          <a:chOff x="0" y="0"/>
-          <a:chExt cx="0" cy="0"/>
-        </a:xfrm>
-      </p:grpSpPr>
-      <p:sp>
-        <p:nvSpPr>
-          <p:cNvPr id="2" name="Title 1"/>
-          <p:cNvSpPr>
-            <a:spLocks noGrp="1"/>
-          </p:cNvSpPr>
-          <p:nvPr>
-            <p:ph type="title"/>
-          </p:nvPr>
-        </p:nvSpPr>
-        <p:spPr/>
-        <p:txBody>
-          <a:bodyPr>
-            <a:normAutofit/>
-          </a:bodyPr>
-          <a:lstStyle/>
-          <a:p>
-            <a:r>
-              <a:rPr lang="en-US" sz="4400" dirty="0">
-                <a:solidFill>
-                  <a:schemeClr val="tx1"/>
-                </a:solidFill>
-                <a:latin typeface="Segoe UI Light" panose="020B0502040204020203" pitchFamily="34" charset="0"/>
-                <a:cs typeface="Segoe UI Light" panose="020B0502040204020203" pitchFamily="34" charset="0"/>
-              </a:rPr>
-              <a:t>Step 3: Present the solution</a:t>
-            </a:r>
-          </a:p>
-        </p:txBody>
-      </p:sp>
-      <p:sp>
-        <p:nvSpPr>
-          <p:cNvPr id="9" name="TextBox 8">
-            <a:extLst>
-              <a:ext uri="{FF2B5EF4-FFF2-40B4-BE49-F238E27FC236}">
-                <a16:creationId xmlns:a16="http://schemas.microsoft.com/office/drawing/2014/main" id="{0F86F9F9-39B5-4CE6-AF48-9ADAE40EA728}"/>
-              </a:ext>
-            </a:extLst>
-          </p:cNvPr>
-          <p:cNvSpPr txBox="1"/>
-          <p:nvPr/>
-        </p:nvSpPr>
-        <p:spPr>
-          <a:xfrm>
-            <a:off x="340285" y="1062166"/>
-            <a:ext cx="11472487" cy="6004721"/>
-          </a:xfrm>
-          <a:prstGeom prst="rect">
-            <a:avLst/>
-          </a:prstGeom>
-          <a:noFill/>
-        </p:spPr>
-        <p:txBody>
-          <a:bodyPr wrap="square" lIns="182880" tIns="146304" rIns="182880" bIns="146304" rtlCol="0">
-            <a:spAutoFit/>
-          </a:bodyPr>
-          <a:lstStyle/>
-          <a:p>
-            <a:pPr>
-              <a:lnSpc>
-                <a:spcPct val="90000"/>
-              </a:lnSpc>
-              <a:spcAft>
-                <a:spcPts val="600"/>
-              </a:spcAft>
-            </a:pPr>
-            <a:r>
-              <a:rPr lang="en-US" sz="3600" dirty="0">
-                <a:latin typeface="+mj-lt"/>
-              </a:rPr>
-              <a:t>Outcome</a:t>
-            </a:r>
-          </a:p>
-          <a:p>
-            <a:pPr>
-              <a:lnSpc>
-                <a:spcPct val="90000"/>
-              </a:lnSpc>
-              <a:spcAft>
-                <a:spcPts val="600"/>
-              </a:spcAft>
-            </a:pPr>
-            <a:r>
-              <a:rPr lang="en-US" sz="2400" dirty="0">
-                <a:latin typeface="Segoe UI Semilight" panose="020B0402040204020203" pitchFamily="34" charset="0"/>
-                <a:cs typeface="Segoe UI Semilight" panose="020B0402040204020203" pitchFamily="34" charset="0"/>
-              </a:rPr>
-              <a:t>Prepare to present a solution to the target customer in a 15-minute chalk-talk format. </a:t>
-            </a:r>
-            <a:endParaRPr lang="en-US" sz="3600" dirty="0">
-              <a:latin typeface="+mj-lt"/>
-            </a:endParaRPr>
-          </a:p>
-          <a:p>
-            <a:pPr>
-              <a:lnSpc>
-                <a:spcPct val="90000"/>
-              </a:lnSpc>
-              <a:spcAft>
-                <a:spcPts val="600"/>
-              </a:spcAft>
-            </a:pPr>
-            <a:endParaRPr lang="en-US" dirty="0">
-              <a:latin typeface="+mj-lt"/>
-            </a:endParaRPr>
-          </a:p>
-          <a:p>
-            <a:pPr>
-              <a:lnSpc>
-                <a:spcPct val="90000"/>
-              </a:lnSpc>
-              <a:spcAft>
-                <a:spcPts val="600"/>
-              </a:spcAft>
-            </a:pPr>
-            <a:r>
-              <a:rPr lang="en-US" sz="3600" dirty="0">
-                <a:latin typeface="+mj-lt"/>
-              </a:rPr>
-              <a:t>Timeframe</a:t>
-            </a:r>
-          </a:p>
-          <a:p>
-            <a:pPr>
-              <a:lnSpc>
-                <a:spcPct val="90000"/>
-              </a:lnSpc>
-              <a:spcAft>
-                <a:spcPts val="600"/>
-              </a:spcAft>
-            </a:pPr>
-            <a:r>
-              <a:rPr lang="en-US" sz="2400" dirty="0">
-                <a:latin typeface="Segoe UI Semilight" panose="020B0402040204020203" pitchFamily="34" charset="0"/>
-                <a:cs typeface="Segoe UI Semilight" panose="020B0402040204020203" pitchFamily="34" charset="0"/>
-              </a:rPr>
-              <a:t>30 minutes (15 minutes for each team to present and receive feedback) </a:t>
-            </a:r>
-          </a:p>
-          <a:p>
-            <a:pPr>
-              <a:lnSpc>
-                <a:spcPct val="90000"/>
-              </a:lnSpc>
-              <a:spcAft>
-                <a:spcPts val="600"/>
-              </a:spcAft>
-            </a:pPr>
-            <a:endParaRPr lang="en-US" dirty="0">
-              <a:latin typeface="+mj-lt"/>
-            </a:endParaRPr>
-          </a:p>
-          <a:p>
-            <a:pPr>
-              <a:lnSpc>
-                <a:spcPct val="90000"/>
-              </a:lnSpc>
-              <a:spcAft>
-                <a:spcPts val="600"/>
-              </a:spcAft>
-            </a:pPr>
-            <a:r>
-              <a:rPr lang="en-US" sz="3600" dirty="0">
-                <a:latin typeface="+mj-lt"/>
-              </a:rPr>
-              <a:t>Directions</a:t>
-            </a:r>
-          </a:p>
-          <a:p>
-            <a:pPr marL="342900" lvl="0" indent="-342900">
-              <a:buFont typeface="Arial" panose="020B0604020202020204" pitchFamily="34" charset="0"/>
-              <a:buChar char="•"/>
-            </a:pPr>
-            <a:r>
-              <a:rPr lang="en-US" sz="2000" dirty="0">
-                <a:latin typeface="Segoe UI Semilight" panose="020B0402040204020203" pitchFamily="34" charset="0"/>
-                <a:cs typeface="Segoe UI Semilight" panose="020B0402040204020203" pitchFamily="34" charset="0"/>
-              </a:rPr>
-              <a:t>Pair with another table.</a:t>
-            </a:r>
-          </a:p>
-          <a:p>
-            <a:pPr marL="342900" lvl="0" indent="-342900">
-              <a:buFont typeface="Arial" panose="020B0604020202020204" pitchFamily="34" charset="0"/>
-              <a:buChar char="•"/>
-            </a:pPr>
-            <a:r>
-              <a:rPr lang="en-US" sz="2000" dirty="0">
-                <a:latin typeface="Segoe UI Semilight" panose="020B0402040204020203" pitchFamily="34" charset="0"/>
-                <a:cs typeface="Segoe UI Semilight" panose="020B0402040204020203" pitchFamily="34" charset="0"/>
-              </a:rPr>
-              <a:t>One table is the Microsoft team and the other table is the customer.</a:t>
-            </a:r>
-          </a:p>
-          <a:p>
-            <a:pPr marL="342900" lvl="0" indent="-342900">
-              <a:buFont typeface="Arial" panose="020B0604020202020204" pitchFamily="34" charset="0"/>
-              <a:buChar char="•"/>
-            </a:pPr>
-            <a:r>
-              <a:rPr lang="en-US" sz="2000" dirty="0">
-                <a:latin typeface="Segoe UI Semilight" panose="020B0402040204020203" pitchFamily="34" charset="0"/>
-                <a:cs typeface="Segoe UI Semilight" panose="020B0402040204020203" pitchFamily="34" charset="0"/>
-              </a:rPr>
-              <a:t>The Microsoft team presents their proposed solution to the customer.</a:t>
-            </a:r>
-          </a:p>
-          <a:p>
-            <a:pPr marL="342900" lvl="0" indent="-342900">
-              <a:buFont typeface="Arial" panose="020B0604020202020204" pitchFamily="34" charset="0"/>
-              <a:buChar char="•"/>
-            </a:pPr>
-            <a:r>
-              <a:rPr lang="en-US" sz="2000" dirty="0">
-                <a:latin typeface="Segoe UI Semilight" panose="020B0402040204020203" pitchFamily="34" charset="0"/>
-                <a:cs typeface="Segoe UI Semilight" panose="020B0402040204020203" pitchFamily="34" charset="0"/>
-              </a:rPr>
-              <a:t>The customer asks one of the objections from the list of objections in the case study.</a:t>
-            </a:r>
-          </a:p>
-          <a:p>
-            <a:pPr marL="342900" lvl="0" indent="-342900">
-              <a:buFont typeface="Arial" panose="020B0604020202020204" pitchFamily="34" charset="0"/>
-              <a:buChar char="•"/>
-            </a:pPr>
-            <a:r>
-              <a:rPr lang="en-US" sz="2000" dirty="0">
-                <a:latin typeface="Segoe UI Semilight" panose="020B0402040204020203" pitchFamily="34" charset="0"/>
-                <a:cs typeface="Segoe UI Semilight" panose="020B0402040204020203" pitchFamily="34" charset="0"/>
-              </a:rPr>
-              <a:t>The Microsoft team responds to the objection.</a:t>
-            </a:r>
-          </a:p>
-          <a:p>
-            <a:pPr marL="342900" lvl="0" indent="-342900">
-              <a:buFont typeface="Arial" panose="020B0604020202020204" pitchFamily="34" charset="0"/>
-              <a:buChar char="•"/>
-            </a:pPr>
-            <a:r>
-              <a:rPr lang="en-US" sz="2000" dirty="0">
-                <a:latin typeface="Segoe UI Semilight" panose="020B0402040204020203" pitchFamily="34" charset="0"/>
-                <a:cs typeface="Segoe UI Semilight" panose="020B0402040204020203" pitchFamily="34" charset="0"/>
-              </a:rPr>
-              <a:t>The customer team gives feedback to the Microsoft team.</a:t>
-            </a:r>
-            <a:endParaRPr lang="en-US" sz="2000" strike="sngStrike" dirty="0">
-              <a:latin typeface="Segoe UI Semilight" panose="020B0402040204020203" pitchFamily="34" charset="0"/>
-              <a:cs typeface="Segoe UI Semilight" panose="020B0402040204020203" pitchFamily="34" charset="0"/>
-            </a:endParaRPr>
-          </a:p>
-          <a:p>
-            <a:pPr>
-              <a:lnSpc>
-                <a:spcPct val="90000"/>
-              </a:lnSpc>
-              <a:spcAft>
-                <a:spcPts val="600"/>
-              </a:spcAft>
-            </a:pPr>
-            <a:endParaRPr lang="en-US" sz="2400" dirty="0">
-              <a:latin typeface="Segoe UI Semilight" panose="020B0402040204020203" pitchFamily="34" charset="0"/>
-              <a:cs typeface="Segoe UI Semilight" panose="020B0402040204020203" pitchFamily="34" charset="0"/>
-            </a:endParaRPr>
-          </a:p>
-        </p:txBody>
-      </p:sp>
-    </p:spTree>
-    <p:extLst>
-      <p:ext uri="{BB962C8B-B14F-4D97-AF65-F5344CB8AC3E}">
-        <p14:creationId xmlns:p14="http://schemas.microsoft.com/office/powerpoint/2010/main" val="3717261927"/>
-      </p:ext>
-    </p:extLst>
-  </p:cSld>
-  <p:clrMapOvr>
-    <a:masterClrMapping/>
-  </p:clrMapOvr>
-  <mc:AlternateContent xmlns:mc="http://schemas.openxmlformats.org/markup-compatibility/2006" xmlns:p14="http://schemas.microsoft.com/office/powerpoint/2010/main">
-    <mc:Choice Requires="p14">
-      <p:transition p14:dur="0"/>
-    </mc:Choice>
-    <mc:Fallback xmlns="">
-      <p:transition/>
-    </mc:Fallback>
-  </mc:AlternateContent>
-</p:sld>
-</file>
-
 <file path=ppt/slides/slide16.xml><?xml version="1.0" encoding="utf-8"?>
 <p:sld xmlns:a="http://schemas.openxmlformats.org/drawingml/2006/main" xmlns:r="http://schemas.openxmlformats.org/officeDocument/2006/relationships" xmlns:p="http://schemas.openxmlformats.org/presentationml/2006/main">
   <p:cSld>
@@ -16600,6 +16564,310 @@
                 <a:latin typeface="Segoe UI Light" panose="020B0502040204020203" pitchFamily="34" charset="0"/>
                 <a:cs typeface="Segoe UI Light" panose="020B0502040204020203" pitchFamily="34" charset="0"/>
               </a:rPr>
+              <a:t>Step 3: Present the solution</a:t>
+            </a:r>
+          </a:p>
+        </p:txBody>
+      </p:sp>
+      <p:sp>
+        <p:nvSpPr>
+          <p:cNvPr id="9" name="TextBox 8">
+            <a:extLst>
+              <a:ext uri="{FF2B5EF4-FFF2-40B4-BE49-F238E27FC236}">
+                <a16:creationId xmlns:a16="http://schemas.microsoft.com/office/drawing/2014/main" id="{0F86F9F9-39B5-4CE6-AF48-9ADAE40EA728}"/>
+              </a:ext>
+            </a:extLst>
+          </p:cNvPr>
+          <p:cNvSpPr txBox="1"/>
+          <p:nvPr/>
+        </p:nvSpPr>
+        <p:spPr>
+          <a:xfrm>
+            <a:off x="340285" y="1062166"/>
+            <a:ext cx="11472487" cy="6004721"/>
+          </a:xfrm>
+          <a:prstGeom prst="rect">
+            <a:avLst/>
+          </a:prstGeom>
+          <a:noFill/>
+        </p:spPr>
+        <p:txBody>
+          <a:bodyPr wrap="square" lIns="182880" tIns="146304" rIns="182880" bIns="146304" rtlCol="0">
+            <a:spAutoFit/>
+          </a:bodyPr>
+          <a:lstStyle/>
+          <a:p>
+            <a:pPr>
+              <a:lnSpc>
+                <a:spcPct val="90000"/>
+              </a:lnSpc>
+              <a:spcAft>
+                <a:spcPts val="600"/>
+              </a:spcAft>
+            </a:pPr>
+            <a:r>
+              <a:rPr lang="en-US" sz="3600" dirty="0">
+                <a:latin typeface="+mj-lt"/>
+              </a:rPr>
+              <a:t>Outcome</a:t>
+            </a:r>
+          </a:p>
+          <a:p>
+            <a:pPr>
+              <a:lnSpc>
+                <a:spcPct val="90000"/>
+              </a:lnSpc>
+              <a:spcAft>
+                <a:spcPts val="600"/>
+              </a:spcAft>
+            </a:pPr>
+            <a:r>
+              <a:rPr lang="en-US" sz="2400" dirty="0">
+                <a:latin typeface="Segoe UI Semilight" panose="020B0402040204020203" pitchFamily="34" charset="0"/>
+                <a:cs typeface="Segoe UI Semilight" panose="020B0402040204020203" pitchFamily="34" charset="0"/>
+              </a:rPr>
+              <a:t>Prepare to present a solution to the target customer in a 15-minute chalk-talk format. </a:t>
+            </a:r>
+            <a:endParaRPr lang="en-US" sz="3600" dirty="0">
+              <a:latin typeface="+mj-lt"/>
+            </a:endParaRPr>
+          </a:p>
+          <a:p>
+            <a:pPr>
+              <a:lnSpc>
+                <a:spcPct val="90000"/>
+              </a:lnSpc>
+              <a:spcAft>
+                <a:spcPts val="600"/>
+              </a:spcAft>
+            </a:pPr>
+            <a:endParaRPr lang="en-US" dirty="0">
+              <a:latin typeface="+mj-lt"/>
+            </a:endParaRPr>
+          </a:p>
+          <a:p>
+            <a:pPr>
+              <a:lnSpc>
+                <a:spcPct val="90000"/>
+              </a:lnSpc>
+              <a:spcAft>
+                <a:spcPts val="600"/>
+              </a:spcAft>
+            </a:pPr>
+            <a:r>
+              <a:rPr lang="en-US" sz="3600" dirty="0">
+                <a:latin typeface="+mj-lt"/>
+              </a:rPr>
+              <a:t>Timeframe</a:t>
+            </a:r>
+          </a:p>
+          <a:p>
+            <a:pPr>
+              <a:lnSpc>
+                <a:spcPct val="90000"/>
+              </a:lnSpc>
+              <a:spcAft>
+                <a:spcPts val="600"/>
+              </a:spcAft>
+            </a:pPr>
+            <a:r>
+              <a:rPr lang="en-US" sz="2400" dirty="0">
+                <a:latin typeface="Segoe UI Semilight" panose="020B0402040204020203" pitchFamily="34" charset="0"/>
+                <a:cs typeface="Segoe UI Semilight" panose="020B0402040204020203" pitchFamily="34" charset="0"/>
+              </a:rPr>
+              <a:t>30 minutes (15 minutes for each team to present and receive feedback) </a:t>
+            </a:r>
+          </a:p>
+          <a:p>
+            <a:pPr>
+              <a:lnSpc>
+                <a:spcPct val="90000"/>
+              </a:lnSpc>
+              <a:spcAft>
+                <a:spcPts val="600"/>
+              </a:spcAft>
+            </a:pPr>
+            <a:endParaRPr lang="en-US" dirty="0">
+              <a:latin typeface="+mj-lt"/>
+            </a:endParaRPr>
+          </a:p>
+          <a:p>
+            <a:pPr>
+              <a:lnSpc>
+                <a:spcPct val="90000"/>
+              </a:lnSpc>
+              <a:spcAft>
+                <a:spcPts val="600"/>
+              </a:spcAft>
+            </a:pPr>
+            <a:r>
+              <a:rPr lang="en-US" sz="3600" dirty="0">
+                <a:latin typeface="+mj-lt"/>
+              </a:rPr>
+              <a:t>Directions</a:t>
+            </a:r>
+          </a:p>
+          <a:p>
+            <a:pPr marL="342900" lvl="0" indent="-342900">
+              <a:buFont typeface="Arial" panose="020B0604020202020204" pitchFamily="34" charset="0"/>
+              <a:buChar char="•"/>
+            </a:pPr>
+            <a:r>
+              <a:rPr lang="en-US" sz="2000" dirty="0">
+                <a:latin typeface="Segoe UI Semilight" panose="020B0402040204020203" pitchFamily="34" charset="0"/>
+                <a:cs typeface="Segoe UI Semilight" panose="020B0402040204020203" pitchFamily="34" charset="0"/>
+              </a:rPr>
+              <a:t>Pair with another table.</a:t>
+            </a:r>
+          </a:p>
+          <a:p>
+            <a:pPr marL="342900" lvl="0" indent="-342900">
+              <a:buFont typeface="Arial" panose="020B0604020202020204" pitchFamily="34" charset="0"/>
+              <a:buChar char="•"/>
+            </a:pPr>
+            <a:r>
+              <a:rPr lang="en-US" sz="2000" dirty="0">
+                <a:latin typeface="Segoe UI Semilight" panose="020B0402040204020203" pitchFamily="34" charset="0"/>
+                <a:cs typeface="Segoe UI Semilight" panose="020B0402040204020203" pitchFamily="34" charset="0"/>
+              </a:rPr>
+              <a:t>One table is the Microsoft team and the other table is the customer.</a:t>
+            </a:r>
+          </a:p>
+          <a:p>
+            <a:pPr marL="342900" lvl="0" indent="-342900">
+              <a:buFont typeface="Arial" panose="020B0604020202020204" pitchFamily="34" charset="0"/>
+              <a:buChar char="•"/>
+            </a:pPr>
+            <a:r>
+              <a:rPr lang="en-US" sz="2000" dirty="0">
+                <a:latin typeface="Segoe UI Semilight" panose="020B0402040204020203" pitchFamily="34" charset="0"/>
+                <a:cs typeface="Segoe UI Semilight" panose="020B0402040204020203" pitchFamily="34" charset="0"/>
+              </a:rPr>
+              <a:t>The Microsoft team presents their proposed solution to the customer.</a:t>
+            </a:r>
+          </a:p>
+          <a:p>
+            <a:pPr marL="342900" lvl="0" indent="-342900">
+              <a:buFont typeface="Arial" panose="020B0604020202020204" pitchFamily="34" charset="0"/>
+              <a:buChar char="•"/>
+            </a:pPr>
+            <a:r>
+              <a:rPr lang="en-US" sz="2000" dirty="0">
+                <a:latin typeface="Segoe UI Semilight" panose="020B0402040204020203" pitchFamily="34" charset="0"/>
+                <a:cs typeface="Segoe UI Semilight" panose="020B0402040204020203" pitchFamily="34" charset="0"/>
+              </a:rPr>
+              <a:t>The customer asks one of the objections from the list of objections in the case study.</a:t>
+            </a:r>
+          </a:p>
+          <a:p>
+            <a:pPr marL="342900" lvl="0" indent="-342900">
+              <a:buFont typeface="Arial" panose="020B0604020202020204" pitchFamily="34" charset="0"/>
+              <a:buChar char="•"/>
+            </a:pPr>
+            <a:r>
+              <a:rPr lang="en-US" sz="2000" dirty="0">
+                <a:latin typeface="Segoe UI Semilight" panose="020B0402040204020203" pitchFamily="34" charset="0"/>
+                <a:cs typeface="Segoe UI Semilight" panose="020B0402040204020203" pitchFamily="34" charset="0"/>
+              </a:rPr>
+              <a:t>The Microsoft team responds to the objection.</a:t>
+            </a:r>
+          </a:p>
+          <a:p>
+            <a:pPr marL="342900" lvl="0" indent="-342900">
+              <a:buFont typeface="Arial" panose="020B0604020202020204" pitchFamily="34" charset="0"/>
+              <a:buChar char="•"/>
+            </a:pPr>
+            <a:r>
+              <a:rPr lang="en-US" sz="2000" dirty="0">
+                <a:latin typeface="Segoe UI Semilight" panose="020B0402040204020203" pitchFamily="34" charset="0"/>
+                <a:cs typeface="Segoe UI Semilight" panose="020B0402040204020203" pitchFamily="34" charset="0"/>
+              </a:rPr>
+              <a:t>The customer team gives feedback to the Microsoft team.</a:t>
+            </a:r>
+            <a:endParaRPr lang="en-US" sz="2000" strike="sngStrike" dirty="0">
+              <a:latin typeface="Segoe UI Semilight" panose="020B0402040204020203" pitchFamily="34" charset="0"/>
+              <a:cs typeface="Segoe UI Semilight" panose="020B0402040204020203" pitchFamily="34" charset="0"/>
+            </a:endParaRPr>
+          </a:p>
+          <a:p>
+            <a:pPr>
+              <a:lnSpc>
+                <a:spcPct val="90000"/>
+              </a:lnSpc>
+              <a:spcAft>
+                <a:spcPts val="600"/>
+              </a:spcAft>
+            </a:pPr>
+            <a:endParaRPr lang="en-US" sz="2400" dirty="0">
+              <a:latin typeface="Segoe UI Semilight" panose="020B0402040204020203" pitchFamily="34" charset="0"/>
+              <a:cs typeface="Segoe UI Semilight" panose="020B0402040204020203" pitchFamily="34" charset="0"/>
+            </a:endParaRPr>
+          </a:p>
+        </p:txBody>
+      </p:sp>
+    </p:spTree>
+    <p:extLst>
+      <p:ext uri="{BB962C8B-B14F-4D97-AF65-F5344CB8AC3E}">
+        <p14:creationId xmlns:p14="http://schemas.microsoft.com/office/powerpoint/2010/main" val="3717261927"/>
+      </p:ext>
+    </p:extLst>
+  </p:cSld>
+  <p:clrMapOvr>
+    <a:masterClrMapping/>
+  </p:clrMapOvr>
+  <mc:AlternateContent xmlns:mc="http://schemas.openxmlformats.org/markup-compatibility/2006" xmlns:p14="http://schemas.microsoft.com/office/powerpoint/2010/main">
+    <mc:Choice Requires="p14">
+      <p:transition p14:dur="0"/>
+    </mc:Choice>
+    <mc:Fallback xmlns="">
+      <p:transition/>
+    </mc:Fallback>
+  </mc:AlternateContent>
+</p:sld>
+</file>
+
+<file path=ppt/slides/slide17.xml><?xml version="1.0" encoding="utf-8"?>
+<p:sld xmlns:a="http://schemas.openxmlformats.org/drawingml/2006/main" xmlns:r="http://schemas.openxmlformats.org/officeDocument/2006/relationships" xmlns:p="http://schemas.openxmlformats.org/presentationml/2006/main">
+  <p:cSld>
+    <p:spTree>
+      <p:nvGrpSpPr>
+        <p:cNvPr id="1" name=""/>
+        <p:cNvGrpSpPr/>
+        <p:nvPr/>
+      </p:nvGrpSpPr>
+      <p:grpSpPr>
+        <a:xfrm>
+          <a:off x="0" y="0"/>
+          <a:ext cx="0" cy="0"/>
+          <a:chOff x="0" y="0"/>
+          <a:chExt cx="0" cy="0"/>
+        </a:xfrm>
+      </p:grpSpPr>
+      <p:sp>
+        <p:nvSpPr>
+          <p:cNvPr id="2" name="Title 1"/>
+          <p:cNvSpPr>
+            <a:spLocks noGrp="1"/>
+          </p:cNvSpPr>
+          <p:nvPr>
+            <p:ph type="title"/>
+          </p:nvPr>
+        </p:nvSpPr>
+        <p:spPr/>
+        <p:txBody>
+          <a:bodyPr>
+            <a:normAutofit/>
+          </a:bodyPr>
+          <a:lstStyle/>
+          <a:p>
+            <a:r>
+              <a:rPr lang="en-US" sz="4400" dirty="0">
+                <a:solidFill>
+                  <a:schemeClr val="tx1"/>
+                </a:solidFill>
+                <a:latin typeface="Segoe UI Light" panose="020B0502040204020203" pitchFamily="34" charset="0"/>
+                <a:cs typeface="Segoe UI Light" panose="020B0502040204020203" pitchFamily="34" charset="0"/>
+              </a:rPr>
               <a:t>Wrap-up</a:t>
             </a:r>
           </a:p>
@@ -16749,7 +17017,7 @@
 </p:sld>
 </file>
 
-<file path=ppt/slides/slide17.xml><?xml version="1.0" encoding="utf-8"?>
+<file path=ppt/slides/slide18.xml><?xml version="1.0" encoding="utf-8"?>
 <p:sld xmlns:a="http://schemas.openxmlformats.org/drawingml/2006/main" xmlns:r="http://schemas.openxmlformats.org/officeDocument/2006/relationships" xmlns:p="http://schemas.openxmlformats.org/presentationml/2006/main">
   <p:cSld>
     <p:bg>
@@ -16942,139 +17210,6 @@
 </p:sld>
 </file>
 
-<file path=ppt/slides/slide18.xml><?xml version="1.0" encoding="utf-8"?>
-<p:sld xmlns:a="http://schemas.openxmlformats.org/drawingml/2006/main" xmlns:r="http://schemas.openxmlformats.org/officeDocument/2006/relationships" xmlns:p="http://schemas.openxmlformats.org/presentationml/2006/main">
-  <p:cSld>
-    <p:spTree>
-      <p:nvGrpSpPr>
-        <p:cNvPr id="1" name=""/>
-        <p:cNvGrpSpPr/>
-        <p:nvPr/>
-      </p:nvGrpSpPr>
-      <p:grpSpPr>
-        <a:xfrm>
-          <a:off x="0" y="0"/>
-          <a:ext cx="0" cy="0"/>
-          <a:chOff x="0" y="0"/>
-          <a:chExt cx="0" cy="0"/>
-        </a:xfrm>
-      </p:grpSpPr>
-      <p:sp>
-        <p:nvSpPr>
-          <p:cNvPr id="2" name="Title 1"/>
-          <p:cNvSpPr>
-            <a:spLocks noGrp="1"/>
-          </p:cNvSpPr>
-          <p:nvPr>
-            <p:ph type="title"/>
-          </p:nvPr>
-        </p:nvSpPr>
-        <p:spPr/>
-        <p:txBody>
-          <a:bodyPr>
-            <a:normAutofit fontScale="90000"/>
-          </a:bodyPr>
-          <a:lstStyle/>
-          <a:p>
-            <a:r>
-              <a:rPr lang="en-US" sz="4900" dirty="0">
-                <a:solidFill>
-                  <a:schemeClr val="tx1"/>
-                </a:solidFill>
-                <a:cs typeface="Segoe UI" panose="020B0502040204020203" pitchFamily="34" charset="0"/>
-              </a:rPr>
-              <a:t>Preferred solution</a:t>
-            </a:r>
-            <a:br>
-              <a:rPr lang="en-US" dirty="0">
-                <a:solidFill>
-                  <a:schemeClr val="tx1"/>
-                </a:solidFill>
-                <a:latin typeface="Segoe UI" panose="020B0502040204020203" pitchFamily="34" charset="0"/>
-              </a:rPr>
-            </a:br>
-            <a:endParaRPr lang="en-US" sz="3236" dirty="0">
-              <a:solidFill>
-                <a:schemeClr val="tx1"/>
-              </a:solidFill>
-              <a:latin typeface="Segoe UI" panose="020B0502040204020203" pitchFamily="34" charset="0"/>
-            </a:endParaRPr>
-          </a:p>
-        </p:txBody>
-      </p:sp>
-      <p:sp>
-        <p:nvSpPr>
-          <p:cNvPr id="3" name="Content Placeholder 2"/>
-          <p:cNvSpPr>
-            <a:spLocks noGrp="1"/>
-          </p:cNvSpPr>
-          <p:nvPr>
-            <p:ph type="body" sz="quarter" idx="10"/>
-          </p:nvPr>
-        </p:nvSpPr>
-        <p:spPr>
-          <a:xfrm>
-            <a:off x="269239" y="1189177"/>
-            <a:ext cx="11267087" cy="5379312"/>
-          </a:xfrm>
-        </p:spPr>
-        <p:txBody>
-          <a:bodyPr>
-            <a:normAutofit/>
-          </a:bodyPr>
-          <a:lstStyle/>
-          <a:p>
-            <a:pPr lvl="1"/>
-            <a:r>
-              <a:rPr lang="en-US" sz="3600" dirty="0"/>
-              <a:t>After evaluating the options for container platforms on Azure, Fabrikam Medical Conferences decided to move forward with Azure Kubernetes Service (AKS).</a:t>
-            </a:r>
-          </a:p>
-          <a:p>
-            <a:pPr lvl="1"/>
-            <a:endParaRPr lang="en-US" sz="3600" dirty="0"/>
-          </a:p>
-          <a:p>
-            <a:pPr lvl="1"/>
-            <a:r>
-              <a:rPr lang="en-US" sz="3600" dirty="0"/>
-              <a:t>They also decided to move forward with GitHub Actions for infrastructure and container DevOps workflows.</a:t>
-            </a:r>
-          </a:p>
-          <a:p>
-            <a:pPr marL="285753" indent="-285753" defTabSz="914554">
-              <a:buFont typeface="Arial"/>
-              <a:buChar char="•"/>
-            </a:pPr>
-            <a:endParaRPr lang="en-US" sz="3600" dirty="0">
-              <a:solidFill>
-                <a:srgbClr val="FFFFFF"/>
-              </a:solidFill>
-            </a:endParaRPr>
-          </a:p>
-        </p:txBody>
-      </p:sp>
-    </p:spTree>
-    <p:extLst>
-      <p:ext uri="{BB962C8B-B14F-4D97-AF65-F5344CB8AC3E}">
-        <p14:creationId xmlns:p14="http://schemas.microsoft.com/office/powerpoint/2010/main" val="2547985055"/>
-      </p:ext>
-    </p:extLst>
-  </p:cSld>
-  <p:clrMapOvr>
-    <a:masterClrMapping/>
-  </p:clrMapOvr>
-  <mc:AlternateContent xmlns:mc="http://schemas.openxmlformats.org/markup-compatibility/2006" xmlns:p14="http://schemas.microsoft.com/office/powerpoint/2010/main">
-    <mc:Choice Requires="p14">
-      <p:transition p14:dur="0"/>
-    </mc:Choice>
-    <mc:Fallback xmlns="">
-      <p:transition/>
-    </mc:Fallback>
-  </mc:AlternateContent>
-</p:sld>
-</file>
-
 <file path=ppt/slides/slide19.xml><?xml version="1.0" encoding="utf-8"?>
 <p:sld xmlns:a="http://schemas.openxmlformats.org/drawingml/2006/main" xmlns:r="http://schemas.openxmlformats.org/officeDocument/2006/relationships" xmlns:p="http://schemas.openxmlformats.org/presentationml/2006/main">
   <p:cSld>
@@ -17116,7 +17251,7 @@
                 </a:solidFill>
                 <a:cs typeface="Segoe UI" panose="020B0502040204020203" pitchFamily="34" charset="0"/>
               </a:rPr>
-              <a:t>Preferred solution 2</a:t>
+              <a:t>Preferred solution</a:t>
             </a:r>
             <a:br>
               <a:rPr lang="en-US" dirty="0">
@@ -17135,45 +17270,62 @@
           </a:p>
         </p:txBody>
       </p:sp>
-      <p:pic>
-        <p:nvPicPr>
-          <p:cNvPr id="4" name="Picture 3" descr="Solution architecture using Azure Kubernetes Service for hosting microservices, and CI/CD workflow using GitHub Actions.">
-            <a:extLst>
-              <a:ext uri="{FF2B5EF4-FFF2-40B4-BE49-F238E27FC236}">
-                <a16:creationId xmlns:a16="http://schemas.microsoft.com/office/drawing/2014/main" id="{A77DE13A-AD2C-4759-A6A4-111012127BDB}"/>
-              </a:ext>
-            </a:extLst>
-          </p:cNvPr>
-          <p:cNvPicPr>
-            <a:picLocks noChangeAspect="1"/>
-          </p:cNvPicPr>
-          <p:nvPr/>
-        </p:nvPicPr>
-        <p:blipFill>
-          <a:blip r:embed="rId3">
-            <a:extLst>
-              <a:ext uri="{28A0092B-C50C-407E-A947-70E740481C1C}">
-                <a14:useLocalDpi xmlns:a14="http://schemas.microsoft.com/office/drawing/2010/main" val="0"/>
-              </a:ext>
-            </a:extLst>
-          </a:blip>
-          <a:srcRect/>
-          <a:stretch/>
-        </p:blipFill>
+      <p:sp>
+        <p:nvSpPr>
+          <p:cNvPr id="3" name="Content Placeholder 2"/>
+          <p:cNvSpPr>
+            <a:spLocks noGrp="1"/>
+          </p:cNvSpPr>
+          <p:nvPr>
+            <p:ph type="body" sz="quarter" idx="10"/>
+          </p:nvPr>
+        </p:nvSpPr>
         <p:spPr>
           <a:xfrm>
-            <a:off x="1181178" y="1189176"/>
-            <a:ext cx="9829644" cy="5529175"/>
+            <a:off x="269239" y="1189177"/>
+            <a:ext cx="11267087" cy="5379312"/>
           </a:xfrm>
-          <a:prstGeom prst="rect">
-            <a:avLst/>
-          </a:prstGeom>
         </p:spPr>
-      </p:pic>
+        <p:txBody>
+          <a:bodyPr>
+            <a:normAutofit/>
+          </a:bodyPr>
+          <a:lstStyle/>
+          <a:p>
+            <a:pPr lvl="1"/>
+            <a:r>
+              <a:rPr lang="en-US" sz="3600" dirty="0"/>
+              <a:t>After evaluating the options for container platforms on Azure, Fabrikam Medical Conferences decided to move forward with Azure Kubernetes Service (AKS).</a:t>
+            </a:r>
+          </a:p>
+          <a:p>
+            <a:pPr lvl="1"/>
+            <a:endParaRPr lang="en-US" sz="3600" dirty="0"/>
+          </a:p>
+          <a:p>
+            <a:pPr lvl="1"/>
+            <a:r>
+              <a:rPr lang="en-US" sz="3600" dirty="0"/>
+              <a:t>They also decided to move forward with GitHub Actions for infrastructure and container DevOps workflows.</a:t>
+            </a:r>
+          </a:p>
+          <a:p>
+            <a:pPr marL="285753" indent="-285753" defTabSz="914554">
+              <a:buFont typeface="Arial"/>
+              <a:buChar char="•"/>
+            </a:pPr>
+            <a:endParaRPr lang="en-US" sz="3600" dirty="0">
+              <a:solidFill>
+                <a:srgbClr val="FFFFFF"/>
+              </a:solidFill>
+            </a:endParaRPr>
+          </a:p>
+        </p:txBody>
+      </p:sp>
     </p:spTree>
     <p:extLst>
       <p:ext uri="{BB962C8B-B14F-4D97-AF65-F5344CB8AC3E}">
-        <p14:creationId xmlns:p14="http://schemas.microsoft.com/office/powerpoint/2010/main" val="2077532963"/>
+        <p14:creationId xmlns:p14="http://schemas.microsoft.com/office/powerpoint/2010/main" val="2547985055"/>
       </p:ext>
     </p:extLst>
   </p:cSld>
@@ -17486,7 +17638,7 @@
                 </a:solidFill>
                 <a:cs typeface="Segoe UI" panose="020B0502040204020203" pitchFamily="34" charset="0"/>
               </a:rPr>
-              <a:t>Preferred objections handling</a:t>
+              <a:t>Preferred solution 2</a:t>
             </a:r>
             <a:br>
               <a:rPr lang="en-US" dirty="0">
@@ -17505,80 +17657,45 @@
           </a:p>
         </p:txBody>
       </p:sp>
-      <p:sp>
-        <p:nvSpPr>
-          <p:cNvPr id="3" name="Content Placeholder 2"/>
-          <p:cNvSpPr>
-            <a:spLocks noGrp="1"/>
-          </p:cNvSpPr>
-          <p:nvPr>
-            <p:ph type="body" sz="quarter" idx="10"/>
-          </p:nvPr>
-        </p:nvSpPr>
+      <p:pic>
+        <p:nvPicPr>
+          <p:cNvPr id="4" name="Picture 3">
+            <a:extLst>
+              <a:ext uri="{FF2B5EF4-FFF2-40B4-BE49-F238E27FC236}">
+                <a16:creationId xmlns:a16="http://schemas.microsoft.com/office/drawing/2014/main" id="{A77DE13A-AD2C-4759-A6A4-111012127BDB}"/>
+              </a:ext>
+            </a:extLst>
+          </p:cNvPr>
+          <p:cNvPicPr>
+            <a:picLocks noChangeAspect="1"/>
+          </p:cNvPicPr>
+          <p:nvPr/>
+        </p:nvPicPr>
+        <p:blipFill>
+          <a:blip r:embed="rId3">
+            <a:extLst>
+              <a:ext uri="{28A0092B-C50C-407E-A947-70E740481C1C}">
+                <a14:useLocalDpi xmlns:a14="http://schemas.microsoft.com/office/drawing/2010/main" val="0"/>
+              </a:ext>
+            </a:extLst>
+          </a:blip>
+          <a:srcRect/>
+          <a:stretch/>
+        </p:blipFill>
         <p:spPr>
           <a:xfrm>
-            <a:off x="269239" y="1189176"/>
-            <a:ext cx="11653523" cy="5287823"/>
+            <a:off x="1181178" y="1189176"/>
+            <a:ext cx="9829644" cy="5529174"/>
           </a:xfrm>
+          <a:prstGeom prst="rect">
+            <a:avLst/>
+          </a:prstGeom>
         </p:spPr>
-        <p:txBody>
-          <a:bodyPr>
-            <a:normAutofit/>
-          </a:bodyPr>
-          <a:lstStyle/>
-          <a:p>
-            <a:pPr marL="0" indent="0">
-              <a:buNone/>
-            </a:pPr>
-            <a:r>
-              <a:rPr lang="en-US" sz="3600" dirty="0"/>
-              <a:t>There are many ways to deploy Docker containers on Azure. How do those options compare and what are motivations for each? </a:t>
-            </a:r>
-            <a:endParaRPr lang="en-US" sz="2000" i="1" dirty="0"/>
-          </a:p>
-          <a:p>
-            <a:pPr lvl="2"/>
-            <a:r>
-              <a:rPr lang="en-US" sz="2800" b="1" dirty="0"/>
-              <a:t>Azure Kubernetes Services (AKS)</a:t>
-            </a:r>
-            <a:r>
-              <a:rPr lang="en-US" sz="2800" dirty="0"/>
-              <a:t> – the ideal solution for a fully managed experience</a:t>
-            </a:r>
-          </a:p>
-          <a:p>
-            <a:pPr lvl="2"/>
-            <a:r>
-              <a:rPr lang="en-US" sz="2800" b="1" dirty="0"/>
-              <a:t>Azure Container Instances</a:t>
-            </a:r>
-            <a:r>
-              <a:rPr lang="en-US" sz="2800" dirty="0"/>
-              <a:t> – simple, isolated, without management tooling, enabling workload scale on demand</a:t>
-            </a:r>
-          </a:p>
-          <a:p>
-            <a:pPr lvl="2"/>
-            <a:r>
-              <a:rPr lang="en-US" sz="2800" b="1" dirty="0"/>
-              <a:t>Web App for Containers</a:t>
-            </a:r>
-            <a:r>
-              <a:rPr lang="en-US" sz="2800" dirty="0"/>
-              <a:t> – simple PaaS without full-featured container orchestration</a:t>
-            </a:r>
-          </a:p>
-          <a:p>
-            <a:pPr lvl="2"/>
-            <a:endParaRPr lang="en-US" sz="2800" dirty="0"/>
-          </a:p>
-        </p:txBody>
-      </p:sp>
+      </p:pic>
     </p:spTree>
     <p:extLst>
       <p:ext uri="{BB962C8B-B14F-4D97-AF65-F5344CB8AC3E}">
-        <p14:creationId xmlns:p14="http://schemas.microsoft.com/office/powerpoint/2010/main" val="2371438961"/>
+        <p14:creationId xmlns:p14="http://schemas.microsoft.com/office/powerpoint/2010/main" val="2077532963"/>
       </p:ext>
     </p:extLst>
   </p:cSld>
@@ -17637,6 +17754,157 @@
                 </a:solidFill>
                 <a:cs typeface="Segoe UI" panose="020B0502040204020203" pitchFamily="34" charset="0"/>
               </a:rPr>
+              <a:t>Preferred objections handling</a:t>
+            </a:r>
+            <a:br>
+              <a:rPr lang="en-US" dirty="0">
+                <a:solidFill>
+                  <a:schemeClr val="tx1"/>
+                </a:solidFill>
+                <a:latin typeface="Segoe UI" panose="020B0502040204020203" pitchFamily="34" charset="0"/>
+              </a:rPr>
+            </a:br>
+            <a:endParaRPr lang="en-US" sz="3236" dirty="0">
+              <a:solidFill>
+                <a:schemeClr val="tx1"/>
+              </a:solidFill>
+              <a:latin typeface="Segoe UI" panose="020B0502040204020203" pitchFamily="34" charset="0"/>
+            </a:endParaRPr>
+          </a:p>
+        </p:txBody>
+      </p:sp>
+      <p:sp>
+        <p:nvSpPr>
+          <p:cNvPr id="3" name="Content Placeholder 2"/>
+          <p:cNvSpPr>
+            <a:spLocks noGrp="1"/>
+          </p:cNvSpPr>
+          <p:nvPr>
+            <p:ph type="body" sz="quarter" idx="10"/>
+          </p:nvPr>
+        </p:nvSpPr>
+        <p:spPr>
+          <a:xfrm>
+            <a:off x="269239" y="1189176"/>
+            <a:ext cx="11653523" cy="5287823"/>
+          </a:xfrm>
+        </p:spPr>
+        <p:txBody>
+          <a:bodyPr>
+            <a:normAutofit/>
+          </a:bodyPr>
+          <a:lstStyle/>
+          <a:p>
+            <a:pPr marL="0" indent="0">
+              <a:buNone/>
+            </a:pPr>
+            <a:r>
+              <a:rPr lang="en-US" sz="3600" dirty="0"/>
+              <a:t>There are many ways to deploy Docker containers on Azure. How do those options compare and what are motivations for each? </a:t>
+            </a:r>
+            <a:endParaRPr lang="en-US" sz="2000" i="1" dirty="0"/>
+          </a:p>
+          <a:p>
+            <a:pPr lvl="2"/>
+            <a:r>
+              <a:rPr lang="en-US" sz="2800" b="1" dirty="0"/>
+              <a:t>Azure Kubernetes Services (AKS)</a:t>
+            </a:r>
+            <a:r>
+              <a:rPr lang="en-US" sz="2800" dirty="0"/>
+              <a:t> – the ideal solution for a fully managed experience</a:t>
+            </a:r>
+          </a:p>
+          <a:p>
+            <a:pPr lvl="2"/>
+            <a:r>
+              <a:rPr lang="en-US" sz="2800" b="1" dirty="0"/>
+              <a:t>Azure Container Instances</a:t>
+            </a:r>
+            <a:r>
+              <a:rPr lang="en-US" sz="2800" dirty="0"/>
+              <a:t> – simple, isolated, without management tooling, enabling workload scale on demand</a:t>
+            </a:r>
+          </a:p>
+          <a:p>
+            <a:pPr lvl="2"/>
+            <a:r>
+              <a:rPr lang="en-US" sz="2800" b="1" dirty="0"/>
+              <a:t>Web App for Containers</a:t>
+            </a:r>
+            <a:r>
+              <a:rPr lang="en-US" sz="2800" dirty="0"/>
+              <a:t> – simple PaaS without full-featured container orchestration</a:t>
+            </a:r>
+          </a:p>
+          <a:p>
+            <a:pPr lvl="2"/>
+            <a:endParaRPr lang="en-US" sz="2800" dirty="0"/>
+          </a:p>
+        </p:txBody>
+      </p:sp>
+    </p:spTree>
+    <p:extLst>
+      <p:ext uri="{BB962C8B-B14F-4D97-AF65-F5344CB8AC3E}">
+        <p14:creationId xmlns:p14="http://schemas.microsoft.com/office/powerpoint/2010/main" val="2371438961"/>
+      </p:ext>
+    </p:extLst>
+  </p:cSld>
+  <p:clrMapOvr>
+    <a:masterClrMapping/>
+  </p:clrMapOvr>
+  <mc:AlternateContent xmlns:mc="http://schemas.openxmlformats.org/markup-compatibility/2006" xmlns:p14="http://schemas.microsoft.com/office/powerpoint/2010/main">
+    <mc:Choice Requires="p14">
+      <p:transition p14:dur="0"/>
+    </mc:Choice>
+    <mc:Fallback xmlns="">
+      <p:transition/>
+    </mc:Fallback>
+  </mc:AlternateContent>
+</p:sld>
+</file>
+
+<file path=ppt/slides/slide22.xml><?xml version="1.0" encoding="utf-8"?>
+<p:sld xmlns:a="http://schemas.openxmlformats.org/drawingml/2006/main" xmlns:r="http://schemas.openxmlformats.org/officeDocument/2006/relationships" xmlns:p="http://schemas.openxmlformats.org/presentationml/2006/main">
+  <p:cSld>
+    <p:spTree>
+      <p:nvGrpSpPr>
+        <p:cNvPr id="1" name=""/>
+        <p:cNvGrpSpPr/>
+        <p:nvPr/>
+      </p:nvGrpSpPr>
+      <p:grpSpPr>
+        <a:xfrm>
+          <a:off x="0" y="0"/>
+          <a:ext cx="0" cy="0"/>
+          <a:chOff x="0" y="0"/>
+          <a:chExt cx="0" cy="0"/>
+        </a:xfrm>
+      </p:grpSpPr>
+      <p:sp>
+        <p:nvSpPr>
+          <p:cNvPr id="2" name="Title 1"/>
+          <p:cNvSpPr>
+            <a:spLocks noGrp="1"/>
+          </p:cNvSpPr>
+          <p:nvPr>
+            <p:ph type="title"/>
+          </p:nvPr>
+        </p:nvSpPr>
+        <p:spPr/>
+        <p:txBody>
+          <a:bodyPr>
+            <a:normAutofit fontScale="90000"/>
+          </a:bodyPr>
+          <a:lstStyle/>
+          <a:p>
+            <a:r>
+              <a:rPr lang="en-US" sz="4900" dirty="0">
+                <a:solidFill>
+                  <a:schemeClr val="tx1"/>
+                </a:solidFill>
+                <a:cs typeface="Segoe UI" panose="020B0502040204020203" pitchFamily="34" charset="0"/>
+              </a:rPr>
               <a:t>Preferred objections handling 2</a:t>
             </a:r>
             <a:br>
@@ -17722,7 +17990,7 @@
 </p:sld>
 </file>
 
-<file path=ppt/slides/slide22.xml><?xml version="1.0" encoding="utf-8"?>
+<file path=ppt/slides/slide23.xml><?xml version="1.0" encoding="utf-8"?>
 <p:sld xmlns:a="http://schemas.openxmlformats.org/drawingml/2006/main" xmlns:r="http://schemas.openxmlformats.org/officeDocument/2006/relationships" xmlns:p="http://schemas.openxmlformats.org/presentationml/2006/main">
   <p:cSld>
     <p:spTree>
@@ -17853,7 +18121,148 @@
 </p:sld>
 </file>
 
-<file path=ppt/slides/slide23.xml><?xml version="1.0" encoding="utf-8"?>
+<file path=ppt/slides/slide24.xml><?xml version="1.0" encoding="utf-8"?>
+<p:sld xmlns:a="http://schemas.openxmlformats.org/drawingml/2006/main" xmlns:r="http://schemas.openxmlformats.org/officeDocument/2006/relationships" xmlns:p="http://schemas.openxmlformats.org/presentationml/2006/main">
+  <p:cSld>
+    <p:spTree>
+      <p:nvGrpSpPr>
+        <p:cNvPr id="1" name=""/>
+        <p:cNvGrpSpPr/>
+        <p:nvPr/>
+      </p:nvGrpSpPr>
+      <p:grpSpPr>
+        <a:xfrm>
+          <a:off x="0" y="0"/>
+          <a:ext cx="0" cy="0"/>
+          <a:chOff x="0" y="0"/>
+          <a:chExt cx="0" cy="0"/>
+        </a:xfrm>
+      </p:grpSpPr>
+      <p:sp>
+        <p:nvSpPr>
+          <p:cNvPr id="5" name="Text Placeholder 4">
+            <a:extLst>
+              <a:ext uri="{FF2B5EF4-FFF2-40B4-BE49-F238E27FC236}">
+                <a16:creationId xmlns:a16="http://schemas.microsoft.com/office/drawing/2014/main" id="{64D28328-F942-404E-920D-0EB05B27B847}"/>
+              </a:ext>
+            </a:extLst>
+          </p:cNvPr>
+          <p:cNvSpPr>
+            <a:spLocks noGrp="1"/>
+          </p:cNvSpPr>
+          <p:nvPr>
+            <p:ph type="body" sz="quarter" idx="10"/>
+          </p:nvPr>
+        </p:nvSpPr>
+        <p:spPr>
+          <a:xfrm>
+            <a:off x="269239" y="1189177"/>
+            <a:ext cx="11653523" cy="6817123"/>
+          </a:xfrm>
+        </p:spPr>
+        <p:txBody>
+          <a:bodyPr/>
+          <a:lstStyle/>
+          <a:p>
+            <a:pPr marL="0" indent="0">
+              <a:buNone/>
+            </a:pPr>
+            <a:r>
+              <a:rPr lang="en-US" dirty="0"/>
+              <a:t>We know Microsoft offers Cognitive Services with pre-built AI models. What models offer the features we are looking to use for enhancing our conference web site?</a:t>
+            </a:r>
+            <a:endParaRPr lang="en-US" sz="3600" dirty="0"/>
+          </a:p>
+          <a:p>
+            <a:endParaRPr lang="en-US" sz="2000" dirty="0">
+              <a:latin typeface="+mn-lt"/>
+            </a:endParaRPr>
+          </a:p>
+          <a:p>
+            <a:r>
+              <a:rPr lang="en-US" sz="2800" dirty="0">
+                <a:latin typeface="+mn-lt"/>
+              </a:rPr>
+              <a:t>Azure Cognitive Services brings AI within reach for every developer - without requiring machine-learning expertise. All it takes is an API call to embed the ability to implement ML models managed by Microsoft.</a:t>
+            </a:r>
+          </a:p>
+          <a:p>
+            <a:pPr lvl="1"/>
+            <a:r>
+              <a:rPr lang="en-US" sz="2400" dirty="0">
+                <a:latin typeface="+mn-lt"/>
+              </a:rPr>
+              <a:t>Content Moderator API can be used to add machine-assisted content moderation and human review tools for images, text, and videos. You can enhance your ability to detect potentially offensive or unwanted images through machine learning-based classifiers, custom lists, and optical character recognition (OCR).</a:t>
+            </a:r>
+          </a:p>
+          <a:p>
+            <a:pPr lvl="1"/>
+            <a:r>
+              <a:rPr lang="en-US" sz="2400" dirty="0"/>
+              <a:t>Translator API can be used to integrate an AI service for real-time text translation. It can translate text in real-time across more than 70 languages.</a:t>
+            </a:r>
+          </a:p>
+          <a:p>
+            <a:endParaRPr lang="en-US" sz="2800" dirty="0">
+              <a:latin typeface="+mn-lt"/>
+            </a:endParaRPr>
+          </a:p>
+          <a:p>
+            <a:endParaRPr lang="en-US" dirty="0"/>
+          </a:p>
+        </p:txBody>
+      </p:sp>
+      <p:sp>
+        <p:nvSpPr>
+          <p:cNvPr id="3" name="Title 2">
+            <a:extLst>
+              <a:ext uri="{FF2B5EF4-FFF2-40B4-BE49-F238E27FC236}">
+                <a16:creationId xmlns:a16="http://schemas.microsoft.com/office/drawing/2014/main" id="{6EF4C784-5137-C84F-90DE-319C49E447A9}"/>
+              </a:ext>
+            </a:extLst>
+          </p:cNvPr>
+          <p:cNvSpPr>
+            <a:spLocks noGrp="1"/>
+          </p:cNvSpPr>
+          <p:nvPr>
+            <p:ph type="title"/>
+          </p:nvPr>
+        </p:nvSpPr>
+        <p:spPr/>
+        <p:txBody>
+          <a:bodyPr vert="horz" wrap="square" lIns="146304" tIns="91440" rIns="146304" bIns="91440" rtlCol="0" anchor="t">
+            <a:normAutofit/>
+          </a:bodyPr>
+          <a:lstStyle/>
+          <a:p>
+            <a:r>
+              <a:rPr lang="en-US" sz="4400" dirty="0">
+                <a:solidFill>
+                  <a:schemeClr val="tx1"/>
+                </a:solidFill>
+              </a:rPr>
+              <a:t>Preferred objections handling 4</a:t>
+            </a:r>
+          </a:p>
+        </p:txBody>
+      </p:sp>
+    </p:spTree>
+    <p:extLst>
+      <p:ext uri="{BB962C8B-B14F-4D97-AF65-F5344CB8AC3E}">
+        <p14:creationId xmlns:p14="http://schemas.microsoft.com/office/powerpoint/2010/main" val="48389528"/>
+      </p:ext>
+    </p:extLst>
+  </p:cSld>
+  <p:clrMapOvr>
+    <a:masterClrMapping/>
+  </p:clrMapOvr>
+  <p:transition>
+    <p:fade/>
+  </p:transition>
+</p:sld>
+</file>
+
+<file path=ppt/slides/slide25.xml><?xml version="1.0" encoding="utf-8"?>
 <p:sld xmlns:a="http://schemas.openxmlformats.org/drawingml/2006/main" xmlns:r="http://schemas.openxmlformats.org/officeDocument/2006/relationships" xmlns:p="http://schemas.openxmlformats.org/presentationml/2006/main">
   <p:cSld>
     <p:spTree>
@@ -18024,7 +18433,7 @@
 </p:sld>
 </file>
 
-<file path=ppt/slides/slide24.xml><?xml version="1.0" encoding="utf-8"?>
+<file path=ppt/slides/slide26.xml><?xml version="1.0" encoding="utf-8"?>
 <p:sld xmlns:a="http://schemas.openxmlformats.org/drawingml/2006/main" xmlns:r="http://schemas.openxmlformats.org/officeDocument/2006/relationships" xmlns:p="http://schemas.openxmlformats.org/presentationml/2006/main">
   <p:cSld>
     <p:bg>

</xml_diff>

<commit_message>
Resolving review comments and adding relevant blurbs regarding multi-cloud to the WDS
</commit_message>
<xml_diff>
--- a/Whiteboard design session/WDS trainer presentation - Cloud-native applications.pptx
+++ b/Whiteboard design session/WDS trainer presentation - Cloud-native applications.pptx
@@ -223,7 +223,7 @@
           <a:p>
             <a:fld id="{52A13B17-C506-4D51-BB37-16B365906619}" type="datetimeFigureOut">
               <a:rPr lang="en-US" smtClean="0"/>
-              <a:t>11/15/20</a:t>
+              <a:t>12/16/2021</a:t>
             </a:fld>
             <a:endParaRPr lang="en-US" dirty="0"/>
           </a:p>
@@ -2262,7 +2262,7 @@
                   <a:prstClr val="black"/>
                 </a:solidFill>
               </a:rPr>
-              <a:t>11/15/20 5:29 PM</a:t>
+              <a:t>12/16/2021 9:28 AM</a:t>
             </a:fld>
             <a:endParaRPr lang="en-US" dirty="0">
               <a:solidFill>
@@ -15519,11 +15519,11 @@
   <p:clrMapOvr>
     <a:masterClrMapping/>
   </p:clrMapOvr>
-  <mc:AlternateContent xmlns:mc="http://schemas.openxmlformats.org/markup-compatibility/2006">
-    <mc:Choice xmlns:p14="http://schemas.microsoft.com/office/powerpoint/2010/main" Requires="p14">
+  <mc:AlternateContent xmlns:mc="http://schemas.openxmlformats.org/markup-compatibility/2006" xmlns:p14="http://schemas.microsoft.com/office/powerpoint/2010/main">
+    <mc:Choice Requires="p14">
       <p:transition p14:dur="0"/>
     </mc:Choice>
-    <mc:Fallback>
+    <mc:Fallback xmlns="">
       <p:transition/>
     </mc:Fallback>
   </mc:AlternateContent>
@@ -16174,7 +16174,7 @@
         </p:nvGraphicFramePr>
         <p:xfrm>
           <a:off x="3108071" y="3429000"/>
-          <a:ext cx="8040154" cy="3219222"/>
+          <a:ext cx="8040154" cy="3493542"/>
         </p:xfrm>
         <a:graphic>
           <a:graphicData uri="http://schemas.openxmlformats.org/drawingml/2006/table">
@@ -17966,6 +17966,18 @@
               <a:rPr lang="en-US" sz="2800" dirty="0"/>
               <a:t>The best option is to go with a managed cluster such as Azure Kubernetes Service (AKS), native to Azure</a:t>
             </a:r>
+          </a:p>
+          <a:p>
+            <a:pPr lvl="2"/>
+            <a:r>
+              <a:rPr lang="en-US" sz="2800" dirty="0"/>
+              <a:t>AKS allows for future consideration of a multi-cloud approach, leveraging Kubernetes and a variety of other services from alternative </a:t>
+            </a:r>
+            <a:r>
+              <a:rPr lang="en-US" sz="2800"/>
+              <a:t>cloud providers.</a:t>
+            </a:r>
+            <a:endParaRPr lang="en-US" sz="2800" dirty="0"/>
           </a:p>
         </p:txBody>
       </p:sp>

</xml_diff>

<commit_message>
Added Azure Arc-enabled information to the WDS and trainer guides.
</commit_message>
<xml_diff>
--- a/Whiteboard design session/WDS trainer presentation - Cloud-native applications.pptx
+++ b/Whiteboard design session/WDS trainer presentation - Cloud-native applications.pptx
@@ -6,7 +6,7 @@
     <p:sldMasterId id="2147483665" r:id="rId2"/>
   </p:sldMasterIdLst>
   <p:notesMasterIdLst>
-    <p:notesMasterId r:id="rId29"/>
+    <p:notesMasterId r:id="rId30"/>
   </p:notesMasterIdLst>
   <p:sldIdLst>
     <p:sldId id="300" r:id="rId3"/>
@@ -29,12 +29,13 @@
     <p:sldId id="317" r:id="rId20"/>
     <p:sldId id="316" r:id="rId21"/>
     <p:sldId id="332" r:id="rId22"/>
-    <p:sldId id="319" r:id="rId23"/>
-    <p:sldId id="333" r:id="rId24"/>
-    <p:sldId id="334" r:id="rId25"/>
-    <p:sldId id="336" r:id="rId26"/>
-    <p:sldId id="318" r:id="rId27"/>
-    <p:sldId id="315" r:id="rId28"/>
+    <p:sldId id="337" r:id="rId23"/>
+    <p:sldId id="319" r:id="rId24"/>
+    <p:sldId id="333" r:id="rId25"/>
+    <p:sldId id="334" r:id="rId26"/>
+    <p:sldId id="336" r:id="rId27"/>
+    <p:sldId id="318" r:id="rId28"/>
+    <p:sldId id="315" r:id="rId29"/>
   </p:sldIdLst>
   <p:sldSz cx="12192000" cy="6858000"/>
   <p:notesSz cx="6858000" cy="9144000"/>
@@ -223,7 +224,7 @@
           <a:p>
             <a:fld id="{52A13B17-C506-4D51-BB37-16B365906619}" type="datetimeFigureOut">
               <a:rPr lang="en-US" smtClean="0"/>
-              <a:t>12/16/2021</a:t>
+              <a:t>12/29/2021</a:t>
             </a:fld>
             <a:endParaRPr lang="en-US" dirty="0"/>
           </a:p>
@@ -1760,6 +1761,30 @@
           <a:bodyPr/>
           <a:lstStyle/>
           <a:p>
+            <a:r>
+              <a:rPr lang="en-US" dirty="0"/>
+              <a:t>Reference Links:</a:t>
+            </a:r>
+          </a:p>
+          <a:p>
+            <a:r>
+              <a:rPr lang="en-US" dirty="0"/>
+              <a:t>Single operational monitoring view – https://docs.microsoft.com/azure/azure-arc/kubernetes/overview</a:t>
+            </a:r>
+          </a:p>
+          <a:p>
+            <a:r>
+              <a:rPr lang="en-US" dirty="0"/>
+              <a:t>https://docs.microsoft.com/azure/defender-for-cloud/defender-for-containers-introduction?tabs=defender-for-container-arch-aks</a:t>
+            </a:r>
+          </a:p>
+          <a:p>
+            <a:r>
+              <a:rPr lang="en-US" dirty="0"/>
+              <a:t>https://docs.microsoft.com/azure/azure-arc/kubernetes/conceptual-cluster-connect</a:t>
+            </a:r>
+          </a:p>
+          <a:p>
             <a:pPr marL="0" marR="0" lvl="0" indent="0" algn="l" defTabSz="914400" rtl="0" eaLnBrk="1" fontAlgn="auto" latinLnBrk="0" hangingPunct="1">
               <a:lnSpc>
                 <a:spcPct val="100000"/>
@@ -1778,70 +1803,12 @@
               <a:defRPr/>
             </a:pPr>
             <a:r>
-              <a:rPr lang="en-US" sz="1200" kern="1200" dirty="0">
-                <a:solidFill>
-                  <a:schemeClr val="tx1"/>
-                </a:solidFill>
-                <a:effectLst/>
-                <a:latin typeface="+mn-lt"/>
-                <a:ea typeface="+mn-ea"/>
-                <a:cs typeface="+mn-cs"/>
-              </a:rPr>
-              <a:t>The easiest way to move to containers on Azure is to deploy containers to the Linux variant of App Service. However, this option does not provide a full-featured container orchestration platform with highly customizable load balancing, dynamic service discovery, and a holistic approach to container monitoring.</a:t>
-            </a:r>
-          </a:p>
-          <a:p>
-            <a:endParaRPr lang="en-US" sz="1200" kern="1200" dirty="0">
-              <a:solidFill>
-                <a:schemeClr val="tx1"/>
-              </a:solidFill>
-              <a:effectLst/>
-              <a:latin typeface="+mn-lt"/>
-              <a:ea typeface="+mn-ea"/>
-              <a:cs typeface="+mn-cs"/>
-            </a:endParaRPr>
-          </a:p>
-          <a:p>
-            <a:r>
-              <a:rPr lang="en-US" sz="1200" kern="1200" dirty="0">
-                <a:solidFill>
-                  <a:schemeClr val="tx1"/>
-                </a:solidFill>
-                <a:effectLst/>
-                <a:latin typeface="+mn-lt"/>
-                <a:ea typeface="+mn-ea"/>
-                <a:cs typeface="+mn-cs"/>
-              </a:rPr>
-              <a:t>Azure Container Instances also provide a simple way to manage individual containers without management tooling providing a way to do on demand scaling for workloads that need that flexibility.</a:t>
-            </a:r>
-          </a:p>
-          <a:p>
-            <a:r>
-              <a:rPr lang="en-US" sz="1200" kern="1200" dirty="0">
-                <a:solidFill>
-                  <a:schemeClr val="tx1"/>
-                </a:solidFill>
-                <a:effectLst/>
-                <a:latin typeface="+mn-lt"/>
-                <a:ea typeface="+mn-ea"/>
-                <a:cs typeface="+mn-cs"/>
-              </a:rPr>
-              <a:t> </a:t>
-            </a:r>
-          </a:p>
-          <a:p>
-            <a:r>
-              <a:rPr lang="en-US" sz="1200" kern="1200" dirty="0">
-                <a:solidFill>
-                  <a:schemeClr val="tx1"/>
-                </a:solidFill>
-                <a:effectLst/>
-                <a:latin typeface="+mn-lt"/>
-                <a:ea typeface="+mn-ea"/>
-                <a:cs typeface="+mn-cs"/>
-              </a:rPr>
-              <a:t>Ideally, Azure Kubernetes Service (AKS) will provide a fully managed service with the full set of orchestration and management tools. Working with AKS is the best choice to enable migration to AKS while still benefiting from a complete container orchestration experience to support the growth trajectory of the solution.</a:t>
-            </a:r>
+              <a:rPr lang="en-US" dirty="0"/>
+              <a:t>Azure Arc Jump Start - https://azurearcjumpstart.io/</a:t>
+            </a:r>
+          </a:p>
+          <a:p>
+            <a:endParaRPr lang="en-US" dirty="0"/>
           </a:p>
         </p:txBody>
       </p:sp>
@@ -1871,7 +1838,7 @@
     </p:spTree>
     <p:extLst>
       <p:ext uri="{BB962C8B-B14F-4D97-AF65-F5344CB8AC3E}">
-        <p14:creationId xmlns:p14="http://schemas.microsoft.com/office/powerpoint/2010/main" val="4115832635"/>
+        <p14:creationId xmlns:p14="http://schemas.microsoft.com/office/powerpoint/2010/main" val="304292196"/>
       </p:ext>
     </p:extLst>
   </p:cSld>
@@ -1925,6 +1892,23 @@
           <a:bodyPr/>
           <a:lstStyle/>
           <a:p>
+            <a:pPr marL="0" marR="0" lvl="0" indent="0" algn="l" defTabSz="914400" rtl="0" eaLnBrk="1" fontAlgn="auto" latinLnBrk="0" hangingPunct="1">
+              <a:lnSpc>
+                <a:spcPct val="100000"/>
+              </a:lnSpc>
+              <a:spcBef>
+                <a:spcPts val="0"/>
+              </a:spcBef>
+              <a:spcAft>
+                <a:spcPts val="0"/>
+              </a:spcAft>
+              <a:buClrTx/>
+              <a:buSzTx/>
+              <a:buFontTx/>
+              <a:buNone/>
+              <a:tabLst/>
+              <a:defRPr/>
+            </a:pPr>
             <a:r>
               <a:rPr lang="en-US" sz="1200" kern="1200" dirty="0">
                 <a:solidFill>
@@ -1935,7 +1919,7 @@
                 <a:ea typeface="+mn-ea"/>
                 <a:cs typeface="+mn-cs"/>
               </a:rPr>
-              <a:t>The best of all worlds is to go with a managed orchestration platform like AKS – native to Azure. It reduces the cost and management overhead of the cluster, while still providing a solution that supports growth, scale, and native management tooling. </a:t>
+              <a:t>The easiest way to move to containers on Azure is to deploy containers to the Linux variant of App Service. However, this option does not provide a full-featured container orchestration platform with highly customizable load balancing, dynamic service discovery, and a holistic approach to container monitoring.</a:t>
             </a:r>
           </a:p>
           <a:p>
@@ -1960,11 +1944,10 @@
                 <a:ea typeface="+mn-ea"/>
                 <a:cs typeface="+mn-cs"/>
               </a:rPr>
-              <a:t>With Kubernetes, you will have additional features at your fingertips beyond the pure Docker approach including:</a:t>
-            </a:r>
-          </a:p>
-          <a:p>
-            <a:pPr lvl="0" fontAlgn="base"/>
+              <a:t>Azure Container Instances also provide a simple way to manage individual containers without management tooling providing a way to do on demand scaling for workloads that need that flexibility.</a:t>
+            </a:r>
+          </a:p>
+          <a:p>
             <a:r>
               <a:rPr lang="en-US" sz="1200" kern="1200" dirty="0">
                 <a:solidFill>
@@ -1975,11 +1958,10 @@
                 <a:ea typeface="+mn-ea"/>
                 <a:cs typeface="+mn-cs"/>
               </a:rPr>
-              <a:t>The Kubernetes management dashboard which includes the web interface and remote APIs for managing, running, and scaling containers, including CICD integration options.</a:t>
-            </a:r>
-          </a:p>
-          <a:p>
-            <a:pPr lvl="0" fontAlgn="base"/>
+              <a:t> </a:t>
+            </a:r>
+          </a:p>
+          <a:p>
             <a:r>
               <a:rPr lang="en-US" sz="1200" kern="1200" dirty="0">
                 <a:solidFill>
@@ -1990,22 +1972,7 @@
                 <a:ea typeface="+mn-ea"/>
                 <a:cs typeface="+mn-cs"/>
               </a:rPr>
-              <a:t>The kubectl command line tool for engaging remote Kubernetes APIs and assisting with automation. </a:t>
-            </a:r>
-          </a:p>
-          <a:p>
-            <a:pPr lvl="0" fontAlgn="base"/>
-            <a:r>
-              <a:rPr lang="en-US" sz="1200" kern="1200" dirty="0">
-                <a:solidFill>
-                  <a:schemeClr val="tx1"/>
-                </a:solidFill>
-                <a:effectLst/>
-                <a:latin typeface="+mn-lt"/>
-                <a:ea typeface="+mn-ea"/>
-                <a:cs typeface="+mn-cs"/>
-              </a:rPr>
-              <a:t>Built-in dynamic service discovery simplifying the deployment of new container instances to a load balanced environment. </a:t>
+              <a:t>Ideally, Azure Kubernetes Service (AKS) will provide a fully managed service with the full set of orchestration and management tools. Working with AKS is the best choice to enable migration to AKS while still benefiting from a complete container orchestration experience to support the growth trajectory of the solution.</a:t>
             </a:r>
           </a:p>
         </p:txBody>
@@ -2036,7 +2003,7 @@
     </p:spTree>
     <p:extLst>
       <p:ext uri="{BB962C8B-B14F-4D97-AF65-F5344CB8AC3E}">
-        <p14:creationId xmlns:p14="http://schemas.microsoft.com/office/powerpoint/2010/main" val="1806888693"/>
+        <p14:creationId xmlns:p14="http://schemas.microsoft.com/office/powerpoint/2010/main" val="4115832635"/>
       </p:ext>
     </p:extLst>
   </p:cSld>
@@ -2090,7 +2057,88 @@
           <a:bodyPr/>
           <a:lstStyle/>
           <a:p>
-            <a:endParaRPr lang="en-US" dirty="0"/>
+            <a:r>
+              <a:rPr lang="en-US" sz="1200" kern="1200" dirty="0">
+                <a:solidFill>
+                  <a:schemeClr val="tx1"/>
+                </a:solidFill>
+                <a:effectLst/>
+                <a:latin typeface="+mn-lt"/>
+                <a:ea typeface="+mn-ea"/>
+                <a:cs typeface="+mn-cs"/>
+              </a:rPr>
+              <a:t>The best of all worlds is to go with a managed orchestration platform like AKS – native to Azure. It reduces the cost and management overhead of the cluster, while still providing a solution that supports growth, scale, and native management tooling. </a:t>
+            </a:r>
+          </a:p>
+          <a:p>
+            <a:endParaRPr lang="en-US" sz="1200" kern="1200" dirty="0">
+              <a:solidFill>
+                <a:schemeClr val="tx1"/>
+              </a:solidFill>
+              <a:effectLst/>
+              <a:latin typeface="+mn-lt"/>
+              <a:ea typeface="+mn-ea"/>
+              <a:cs typeface="+mn-cs"/>
+            </a:endParaRPr>
+          </a:p>
+          <a:p>
+            <a:r>
+              <a:rPr lang="en-US" sz="1200" kern="1200" dirty="0">
+                <a:solidFill>
+                  <a:schemeClr val="tx1"/>
+                </a:solidFill>
+                <a:effectLst/>
+                <a:latin typeface="+mn-lt"/>
+                <a:ea typeface="+mn-ea"/>
+                <a:cs typeface="+mn-cs"/>
+              </a:rPr>
+              <a:t>With Kubernetes, you will have additional features at your fingertips beyond the pure Docker approach including:</a:t>
+            </a:r>
+          </a:p>
+          <a:p>
+            <a:pPr lvl="0" fontAlgn="base"/>
+            <a:r>
+              <a:rPr lang="en-US" sz="1200" kern="1200" dirty="0">
+                <a:solidFill>
+                  <a:schemeClr val="tx1"/>
+                </a:solidFill>
+                <a:effectLst/>
+                <a:latin typeface="+mn-lt"/>
+                <a:ea typeface="+mn-ea"/>
+                <a:cs typeface="+mn-cs"/>
+              </a:rPr>
+              <a:t>The Kubernetes management dashboard which includes the web interface and remote APIs for managing, running, and scaling containers, including CICD integration options.</a:t>
+            </a:r>
+          </a:p>
+          <a:p>
+            <a:pPr lvl="0" fontAlgn="base"/>
+            <a:r>
+              <a:rPr lang="en-US" sz="1200" kern="1200" dirty="0">
+                <a:solidFill>
+                  <a:schemeClr val="tx1"/>
+                </a:solidFill>
+                <a:effectLst/>
+                <a:latin typeface="+mn-lt"/>
+                <a:ea typeface="+mn-ea"/>
+                <a:cs typeface="+mn-cs"/>
+              </a:rPr>
+              <a:t>The kubectl command line tool for engaging remote Kubernetes APIs and assisting with automation. </a:t>
+            </a:r>
+          </a:p>
+          <a:p>
+            <a:pPr lvl="0" fontAlgn="base"/>
+            <a:r>
+              <a:rPr lang="en-US" sz="1200" kern="1200" dirty="0">
+                <a:solidFill>
+                  <a:schemeClr val="tx1"/>
+                </a:solidFill>
+                <a:effectLst/>
+                <a:latin typeface="+mn-lt"/>
+                <a:ea typeface="+mn-ea"/>
+                <a:cs typeface="+mn-cs"/>
+              </a:rPr>
+              <a:t>Built-in dynamic service discovery simplifying the deployment of new container instances to a load balanced environment. </a:t>
+            </a:r>
           </a:p>
         </p:txBody>
       </p:sp>
@@ -2111,7 +2159,91 @@
           <a:p>
             <a:fld id="{0998D5BB-B127-481F-BC0A-2F77C576BB34}" type="slidenum">
               <a:rPr lang="en-US" smtClean="0"/>
-              <a:t>25</a:t>
+              <a:t>23</a:t>
+            </a:fld>
+            <a:endParaRPr lang="en-US" dirty="0"/>
+          </a:p>
+        </p:txBody>
+      </p:sp>
+    </p:spTree>
+    <p:extLst>
+      <p:ext uri="{BB962C8B-B14F-4D97-AF65-F5344CB8AC3E}">
+        <p14:creationId xmlns:p14="http://schemas.microsoft.com/office/powerpoint/2010/main" val="1806888693"/>
+      </p:ext>
+    </p:extLst>
+  </p:cSld>
+  <p:clrMapOvr>
+    <a:masterClrMapping/>
+  </p:clrMapOvr>
+</p:notes>
+</file>
+
+<file path=ppt/notesSlides/notesSlide24.xml><?xml version="1.0" encoding="utf-8"?>
+<p:notes xmlns:a="http://schemas.openxmlformats.org/drawingml/2006/main" xmlns:r="http://schemas.openxmlformats.org/officeDocument/2006/relationships" xmlns:p="http://schemas.openxmlformats.org/presentationml/2006/main">
+  <p:cSld>
+    <p:spTree>
+      <p:nvGrpSpPr>
+        <p:cNvPr id="1" name=""/>
+        <p:cNvGrpSpPr/>
+        <p:nvPr/>
+      </p:nvGrpSpPr>
+      <p:grpSpPr>
+        <a:xfrm>
+          <a:off x="0" y="0"/>
+          <a:ext cx="0" cy="0"/>
+          <a:chOff x="0" y="0"/>
+          <a:chExt cx="0" cy="0"/>
+        </a:xfrm>
+      </p:grpSpPr>
+      <p:sp>
+        <p:nvSpPr>
+          <p:cNvPr id="2" name="Slide Image Placeholder 1"/>
+          <p:cNvSpPr>
+            <a:spLocks noGrp="1" noRot="1" noChangeAspect="1"/>
+          </p:cNvSpPr>
+          <p:nvPr>
+            <p:ph type="sldImg"/>
+          </p:nvPr>
+        </p:nvSpPr>
+        <p:spPr/>
+      </p:sp>
+      <p:sp>
+        <p:nvSpPr>
+          <p:cNvPr id="3" name="Notes Placeholder 2"/>
+          <p:cNvSpPr>
+            <a:spLocks noGrp="1"/>
+          </p:cNvSpPr>
+          <p:nvPr>
+            <p:ph type="body" idx="1"/>
+          </p:nvPr>
+        </p:nvSpPr>
+        <p:spPr/>
+        <p:txBody>
+          <a:bodyPr/>
+          <a:lstStyle/>
+          <a:p>
+            <a:endParaRPr lang="en-US" dirty="0"/>
+          </a:p>
+        </p:txBody>
+      </p:sp>
+      <p:sp>
+        <p:nvSpPr>
+          <p:cNvPr id="4" name="Slide Number Placeholder 3"/>
+          <p:cNvSpPr>
+            <a:spLocks noGrp="1"/>
+          </p:cNvSpPr>
+          <p:nvPr>
+            <p:ph type="sldNum" sz="quarter" idx="10"/>
+          </p:nvPr>
+        </p:nvSpPr>
+        <p:spPr/>
+        <p:txBody>
+          <a:bodyPr/>
+          <a:lstStyle/>
+          <a:p>
+            <a:fld id="{0998D5BB-B127-481F-BC0A-2F77C576BB34}" type="slidenum">
+              <a:rPr lang="en-US" smtClean="0"/>
+              <a:t>26</a:t>
             </a:fld>
             <a:endParaRPr lang="en-US" dirty="0"/>
           </a:p>
@@ -2130,7 +2262,7 @@
 </p:notes>
 </file>
 
-<file path=ppt/notesSlides/notesSlide24.xml><?xml version="1.0" encoding="utf-8"?>
+<file path=ppt/notesSlides/notesSlide25.xml><?xml version="1.0" encoding="utf-8"?>
 <p:notes xmlns:a="http://schemas.openxmlformats.org/drawingml/2006/main" xmlns:r="http://schemas.openxmlformats.org/officeDocument/2006/relationships" xmlns:p="http://schemas.openxmlformats.org/presentationml/2006/main">
   <p:cSld>
     <p:spTree>
@@ -2237,7 +2369,7 @@
                   <a:prstClr val="black"/>
                 </a:solidFill>
               </a:rPr>
-              <a:t>12/16/2021 3:51 PM</a:t>
+              <a:t>12/29/2021 12:43 PM</a:t>
             </a:fld>
             <a:endParaRPr lang="en-US" dirty="0">
               <a:solidFill>
@@ -2269,7 +2401,7 @@
                 </a:solidFill>
               </a:rPr>
               <a:pPr/>
-              <a:t>26</a:t>
+              <a:t>27</a:t>
             </a:fld>
             <a:endParaRPr lang="en-US" dirty="0">
               <a:solidFill>
@@ -17786,7 +17918,7 @@
                 </a:solidFill>
                 <a:cs typeface="Segoe UI" panose="020B0502040204020203" pitchFamily="34" charset="0"/>
               </a:rPr>
-              <a:t>Preferred objection handling</a:t>
+              <a:t>Preferred solution 3 – Multi-cloud Arc-enabled Services</a:t>
             </a:r>
             <a:br>
               <a:rPr lang="en-US" dirty="0">
@@ -17807,7 +17939,13 @@
       </p:sp>
       <p:sp>
         <p:nvSpPr>
-          <p:cNvPr id="3" name="Content Placeholder 2"/>
+          <p:cNvPr id="5" name="Content Placeholder 2">
+            <a:extLst>
+              <a:ext uri="{FF2B5EF4-FFF2-40B4-BE49-F238E27FC236}">
+                <a16:creationId xmlns:a16="http://schemas.microsoft.com/office/drawing/2014/main" id="{F2969A9E-D18F-4E86-9705-2E480A95900B}"/>
+              </a:ext>
+            </a:extLst>
+          </p:cNvPr>
           <p:cNvSpPr>
             <a:spLocks noGrp="1"/>
           </p:cNvSpPr>
@@ -17817,84 +17955,110 @@
         </p:nvSpPr>
         <p:spPr>
           <a:xfrm>
-            <a:off x="269239" y="1189176"/>
-            <a:ext cx="11653523" cy="5287823"/>
+            <a:off x="269239" y="1656677"/>
+            <a:ext cx="11267087" cy="4911811"/>
           </a:xfrm>
         </p:spPr>
         <p:txBody>
           <a:bodyPr>
-            <a:normAutofit/>
+            <a:normAutofit fontScale="92500" lnSpcReduction="10000"/>
           </a:bodyPr>
           <a:lstStyle/>
           <a:p>
-            <a:pPr marL="0" indent="0">
-              <a:buNone/>
+            <a:pPr lvl="1"/>
+            <a:r>
+              <a:rPr lang="en-US" sz="3600" dirty="0"/>
+              <a:t>Pros</a:t>
+            </a:r>
+          </a:p>
+          <a:p>
+            <a:pPr lvl="2"/>
+            <a:r>
+              <a:rPr lang="en-US" sz="3208" dirty="0"/>
+              <a:t>Vendor independence and flexibility</a:t>
+            </a:r>
+          </a:p>
+          <a:p>
+            <a:pPr lvl="2"/>
+            <a:r>
+              <a:rPr lang="en-US" sz="3208" dirty="0"/>
+              <a:t>Utilize vendor specific capabilities and features</a:t>
+            </a:r>
+          </a:p>
+          <a:p>
+            <a:pPr lvl="2"/>
+            <a:r>
+              <a:rPr lang="en-US" sz="3208" dirty="0"/>
+              <a:t>Reduce vendor to customer geographic latency</a:t>
+            </a:r>
+          </a:p>
+          <a:p>
+            <a:pPr lvl="2"/>
+            <a:r>
+              <a:rPr lang="en-US" sz="3208" dirty="0"/>
+              <a:t>Improve resilience to vendor failure</a:t>
+            </a:r>
+          </a:p>
+          <a:p>
+            <a:pPr lvl="1"/>
+            <a:r>
+              <a:rPr lang="en-US" sz="3600" dirty="0"/>
+              <a:t>Cons</a:t>
+            </a:r>
+          </a:p>
+          <a:p>
+            <a:pPr lvl="2"/>
+            <a:r>
+              <a:rPr lang="en-US" sz="3208" dirty="0"/>
+              <a:t>Single operational monitoring and reporting view</a:t>
+            </a:r>
+          </a:p>
+          <a:p>
+            <a:pPr lvl="2"/>
+            <a:r>
+              <a:rPr lang="en-US" sz="3208" dirty="0"/>
+              <a:t>Increased complexity – licensing, managing costs, compliance, hiring staff, governance, SLA</a:t>
+            </a:r>
+          </a:p>
+          <a:p>
+            <a:pPr lvl="2"/>
+            <a:r>
+              <a:rPr lang="en-US" sz="3208" dirty="0"/>
+              <a:t>Security – attack surface area, identity management</a:t>
+            </a:r>
+          </a:p>
+          <a:p>
+            <a:pPr lvl="2"/>
+            <a:endParaRPr lang="en-US" sz="3208" dirty="0"/>
+          </a:p>
+          <a:p>
+            <a:pPr marL="285753" indent="-285753" defTabSz="914554">
+              <a:buFont typeface="Arial"/>
+              <a:buChar char="•"/>
             </a:pPr>
-            <a:r>
-              <a:rPr lang="en-US" sz="3600" dirty="0"/>
-              <a:t>There are many ways to deploy Docker containers on Azure. How do those options compare and what are motivations for each? </a:t>
-            </a:r>
-          </a:p>
-          <a:p>
-            <a:pPr marL="0" indent="0">
-              <a:buNone/>
-            </a:pPr>
-            <a:endParaRPr lang="en-US" sz="2000" i="1" dirty="0"/>
-          </a:p>
-          <a:p>
-            <a:pPr lvl="2"/>
-            <a:r>
-              <a:rPr lang="en-US" sz="2800" b="1" dirty="0"/>
-              <a:t>Azure Kubernetes Services (AKS)</a:t>
-            </a:r>
-            <a:r>
-              <a:rPr lang="en-US" sz="2800" dirty="0"/>
-              <a:t> – the ideal solution for a fully managed experience</a:t>
-            </a:r>
-          </a:p>
-          <a:p>
-            <a:pPr lvl="2"/>
-            <a:r>
-              <a:rPr lang="en-US" sz="2800" b="1" dirty="0"/>
-              <a:t>Azure Container Instances</a:t>
-            </a:r>
-            <a:r>
-              <a:rPr lang="en-US" sz="2800" dirty="0"/>
-              <a:t> – simple, isolated, without management tooling, enabling workload scale on demand</a:t>
-            </a:r>
-          </a:p>
-          <a:p>
-            <a:pPr lvl="2"/>
-            <a:r>
-              <a:rPr lang="en-US" sz="2800" b="1" dirty="0"/>
-              <a:t>Web App for Containers</a:t>
-            </a:r>
-            <a:r>
-              <a:rPr lang="en-US" sz="2800" dirty="0"/>
-              <a:t> – simple PaaS without full-featured container orchestration</a:t>
-            </a:r>
-          </a:p>
-          <a:p>
-            <a:pPr lvl="2"/>
-            <a:endParaRPr lang="en-US" sz="2800" dirty="0"/>
+            <a:endParaRPr lang="en-US" sz="3600" dirty="0">
+              <a:solidFill>
+                <a:srgbClr val="FFFFFF"/>
+              </a:solidFill>
+            </a:endParaRPr>
           </a:p>
         </p:txBody>
       </p:sp>
     </p:spTree>
     <p:extLst>
       <p:ext uri="{BB962C8B-B14F-4D97-AF65-F5344CB8AC3E}">
-        <p14:creationId xmlns:p14="http://schemas.microsoft.com/office/powerpoint/2010/main" val="2371438961"/>
+        <p14:creationId xmlns:p14="http://schemas.microsoft.com/office/powerpoint/2010/main" val="2027169631"/>
       </p:ext>
     </p:extLst>
   </p:cSld>
   <p:clrMapOvr>
     <a:masterClrMapping/>
   </p:clrMapOvr>
-  <mc:AlternateContent xmlns:mc="http://schemas.openxmlformats.org/markup-compatibility/2006" xmlns:p14="http://schemas.microsoft.com/office/powerpoint/2010/main">
-    <mc:Choice Requires="p14">
+  <mc:AlternateContent xmlns:mc="http://schemas.openxmlformats.org/markup-compatibility/2006">
+    <mc:Choice xmlns:p14="http://schemas.microsoft.com/office/powerpoint/2010/main" Requires="p14">
       <p:transition p14:dur="0"/>
     </mc:Choice>
-    <mc:Fallback xmlns="">
+    <mc:Fallback>
       <p:transition/>
     </mc:Fallback>
   </mc:AlternateContent>
@@ -17942,7 +18106,7 @@
                 </a:solidFill>
                 <a:cs typeface="Segoe UI" panose="020B0502040204020203" pitchFamily="34" charset="0"/>
               </a:rPr>
-              <a:t>Preferred objection handling 2</a:t>
+              <a:t>Preferred objection handling</a:t>
             </a:r>
             <a:br>
               <a:rPr lang="en-US" dirty="0">
@@ -17973,8 +18137,8 @@
         </p:nvSpPr>
         <p:spPr>
           <a:xfrm>
-            <a:off x="269240" y="1444357"/>
-            <a:ext cx="10416482" cy="5287823"/>
+            <a:off x="269239" y="1189176"/>
+            <a:ext cx="11653523" cy="5287823"/>
           </a:xfrm>
         </p:spPr>
         <p:txBody>
@@ -17988,28 +18152,58 @@
             </a:pPr>
             <a:r>
               <a:rPr lang="en-US" sz="3600" dirty="0"/>
-              <a:t>Is there an option in Azure that provides container orchestration platform features that are easy to manage and migrate to, that can also handle our scale and management workflow requirements? </a:t>
+              <a:t>There are many ways to deploy Docker containers on Azure. How do those options compare and what are motivations for each? </a:t>
             </a:r>
           </a:p>
           <a:p>
             <a:pPr marL="0" indent="0">
               <a:buNone/>
             </a:pPr>
-            <a:endParaRPr lang="en-US" sz="1800" i="1" dirty="0"/>
+            <a:endParaRPr lang="en-US" sz="2000" i="1" dirty="0"/>
           </a:p>
           <a:p>
             <a:pPr lvl="2"/>
             <a:r>
+              <a:rPr lang="en-US" sz="2800" b="1" dirty="0"/>
+              <a:t>Azure Kubernetes Services (AKS)</a:t>
+            </a:r>
+            <a:r>
               <a:rPr lang="en-US" sz="2800" dirty="0"/>
-              <a:t>The best option is to go with a managed cluster such as Azure Kubernetes Service (AKS), native to Azure</a:t>
-            </a:r>
+              <a:t> – the ideal solution for a fully managed experience</a:t>
+            </a:r>
+          </a:p>
+          <a:p>
+            <a:pPr lvl="2"/>
+            <a:r>
+              <a:rPr lang="en-US" sz="2800" b="1" dirty="0"/>
+              <a:t>Azure Container Instances</a:t>
+            </a:r>
+            <a:r>
+              <a:rPr lang="en-US" sz="2800" dirty="0"/>
+              <a:t> – simple, isolated, without management tooling, enabling workload scale on demand</a:t>
+            </a:r>
+          </a:p>
+          <a:p>
+            <a:pPr lvl="2"/>
+            <a:r>
+              <a:rPr lang="en-US" sz="2800" b="1" dirty="0"/>
+              <a:t>Web App for Containers</a:t>
+            </a:r>
+            <a:r>
+              <a:rPr lang="en-US" sz="2800" dirty="0"/>
+              <a:t> – simple PaaS without full-featured container orchestration</a:t>
+            </a:r>
+          </a:p>
+          <a:p>
+            <a:pPr lvl="2"/>
+            <a:endParaRPr lang="en-US" sz="2800" dirty="0"/>
           </a:p>
         </p:txBody>
       </p:sp>
     </p:spTree>
     <p:extLst>
       <p:ext uri="{BB962C8B-B14F-4D97-AF65-F5344CB8AC3E}">
-        <p14:creationId xmlns:p14="http://schemas.microsoft.com/office/powerpoint/2010/main" val="3409696839"/>
+        <p14:creationId xmlns:p14="http://schemas.microsoft.com/office/powerpoint/2010/main" val="2371438961"/>
       </p:ext>
     </p:extLst>
   </p:cSld>
@@ -18046,13 +18240,7 @@
       </p:grpSpPr>
       <p:sp>
         <p:nvSpPr>
-          <p:cNvPr id="3" name="Title 2">
-            <a:extLst>
-              <a:ext uri="{FF2B5EF4-FFF2-40B4-BE49-F238E27FC236}">
-                <a16:creationId xmlns:a16="http://schemas.microsoft.com/office/drawing/2014/main" id="{6EF4C784-5137-C84F-90DE-319C49E447A9}"/>
-              </a:ext>
-            </a:extLst>
-          </p:cNvPr>
+          <p:cNvPr id="2" name="Title 1"/>
           <p:cNvSpPr>
             <a:spLocks noGrp="1"/>
           </p:cNvSpPr>
@@ -18062,31 +18250,40 @@
         </p:nvSpPr>
         <p:spPr/>
         <p:txBody>
-          <a:bodyPr vert="horz" wrap="square" lIns="146304" tIns="91440" rIns="146304" bIns="91440" rtlCol="0" anchor="t">
-            <a:normAutofit/>
+          <a:bodyPr>
+            <a:normAutofit fontScale="90000"/>
           </a:bodyPr>
           <a:lstStyle/>
           <a:p>
             <a:r>
-              <a:rPr lang="en-US" sz="4400" dirty="0">
+              <a:rPr lang="en-US" sz="4900" dirty="0">
                 <a:solidFill>
                   <a:schemeClr val="tx1"/>
                 </a:solidFill>
+                <a:cs typeface="Segoe UI" panose="020B0502040204020203" pitchFamily="34" charset="0"/>
               </a:rPr>
-              <a:t>Preferred objection handling 3</a:t>
-            </a:r>
+              <a:t>Preferred objection handling 2</a:t>
+            </a:r>
+            <a:br>
+              <a:rPr lang="en-US" dirty="0">
+                <a:solidFill>
+                  <a:schemeClr val="tx1"/>
+                </a:solidFill>
+                <a:latin typeface="Segoe UI" panose="020B0502040204020203" pitchFamily="34" charset="0"/>
+              </a:rPr>
+            </a:br>
+            <a:endParaRPr lang="en-US" sz="3236" dirty="0">
+              <a:solidFill>
+                <a:schemeClr val="tx1"/>
+              </a:solidFill>
+              <a:latin typeface="Segoe UI" panose="020B0502040204020203" pitchFamily="34" charset="0"/>
+            </a:endParaRPr>
           </a:p>
         </p:txBody>
       </p:sp>
       <p:sp>
         <p:nvSpPr>
-          <p:cNvPr id="5" name="Text Placeholder 4">
-            <a:extLst>
-              <a:ext uri="{FF2B5EF4-FFF2-40B4-BE49-F238E27FC236}">
-                <a16:creationId xmlns:a16="http://schemas.microsoft.com/office/drawing/2014/main" id="{64D28328-F942-404E-920D-0EB05B27B847}"/>
-              </a:ext>
-            </a:extLst>
-          </p:cNvPr>
+          <p:cNvPr id="3" name="Content Placeholder 2"/>
           <p:cNvSpPr>
             <a:spLocks noGrp="1"/>
           </p:cNvSpPr>
@@ -18096,12 +18293,14 @@
         </p:nvSpPr>
         <p:spPr>
           <a:xfrm>
-            <a:off x="269239" y="1189177"/>
-            <a:ext cx="11653523" cy="3956917"/>
+            <a:off x="269240" y="1444357"/>
+            <a:ext cx="10416482" cy="5287823"/>
           </a:xfrm>
         </p:spPr>
         <p:txBody>
-          <a:bodyPr/>
+          <a:bodyPr>
+            <a:normAutofit/>
+          </a:bodyPr>
           <a:lstStyle/>
           <a:p>
             <a:pPr marL="0" indent="0">
@@ -18109,40 +18308,42 @@
             </a:pPr>
             <a:r>
               <a:rPr lang="en-US" sz="3600" dirty="0"/>
-              <a:t>We heard Azure Cosmos DB is compatible with MongoDB. Will this provide a migration that minimized code changes?</a:t>
-            </a:r>
-          </a:p>
-          <a:p>
-            <a:endParaRPr lang="en-US" sz="2800" dirty="0">
-              <a:latin typeface="+mn-lt"/>
-            </a:endParaRPr>
-          </a:p>
-          <a:p>
-            <a:r>
-              <a:rPr lang="en-US" sz="2800" dirty="0">
-                <a:latin typeface="+mn-lt"/>
-              </a:rPr>
-              <a:t>Azure Cosmos DB supports multiple NoSQL data models; including supporting a MongoDB API. This provides compatibility for code written for MongoDB to communicate with Cosmos DB without code changes; for easier migration and interoperability.</a:t>
-            </a:r>
-          </a:p>
-          <a:p>
-            <a:endParaRPr lang="en-US" dirty="0"/>
+              <a:t>Is there an option in Azure that provides container orchestration platform features that are easy to manage and migrate to, that can also handle our scale and management workflow requirements? </a:t>
+            </a:r>
+          </a:p>
+          <a:p>
+            <a:pPr marL="0" indent="0">
+              <a:buNone/>
+            </a:pPr>
+            <a:endParaRPr lang="en-US" sz="1800" i="1" dirty="0"/>
+          </a:p>
+          <a:p>
+            <a:pPr lvl="2"/>
+            <a:r>
+              <a:rPr lang="en-US" sz="2800" dirty="0"/>
+              <a:t>The best option is to go with a managed cluster such as Azure Kubernetes Service (AKS), native to Azure</a:t>
+            </a:r>
           </a:p>
         </p:txBody>
       </p:sp>
     </p:spTree>
     <p:extLst>
       <p:ext uri="{BB962C8B-B14F-4D97-AF65-F5344CB8AC3E}">
-        <p14:creationId xmlns:p14="http://schemas.microsoft.com/office/powerpoint/2010/main" val="244504347"/>
+        <p14:creationId xmlns:p14="http://schemas.microsoft.com/office/powerpoint/2010/main" val="3409696839"/>
       </p:ext>
     </p:extLst>
   </p:cSld>
   <p:clrMapOvr>
     <a:masterClrMapping/>
   </p:clrMapOvr>
-  <p:transition>
-    <p:fade/>
-  </p:transition>
+  <mc:AlternateContent xmlns:mc="http://schemas.openxmlformats.org/markup-compatibility/2006" xmlns:p14="http://schemas.microsoft.com/office/powerpoint/2010/main">
+    <mc:Choice Requires="p14">
+      <p:transition p14:dur="0"/>
+    </mc:Choice>
+    <mc:Fallback xmlns="">
+      <p:transition/>
+    </mc:Fallback>
+  </mc:AlternateContent>
 </p:sld>
 </file>
 
@@ -18192,6 +18393,125 @@
                   <a:schemeClr val="tx1"/>
                 </a:solidFill>
               </a:rPr>
+              <a:t>Preferred objection handling 3</a:t>
+            </a:r>
+          </a:p>
+        </p:txBody>
+      </p:sp>
+      <p:sp>
+        <p:nvSpPr>
+          <p:cNvPr id="5" name="Text Placeholder 4">
+            <a:extLst>
+              <a:ext uri="{FF2B5EF4-FFF2-40B4-BE49-F238E27FC236}">
+                <a16:creationId xmlns:a16="http://schemas.microsoft.com/office/drawing/2014/main" id="{64D28328-F942-404E-920D-0EB05B27B847}"/>
+              </a:ext>
+            </a:extLst>
+          </p:cNvPr>
+          <p:cNvSpPr>
+            <a:spLocks noGrp="1"/>
+          </p:cNvSpPr>
+          <p:nvPr>
+            <p:ph type="body" sz="quarter" idx="10"/>
+          </p:nvPr>
+        </p:nvSpPr>
+        <p:spPr>
+          <a:xfrm>
+            <a:off x="269239" y="1189177"/>
+            <a:ext cx="11653523" cy="3956917"/>
+          </a:xfrm>
+        </p:spPr>
+        <p:txBody>
+          <a:bodyPr/>
+          <a:lstStyle/>
+          <a:p>
+            <a:pPr marL="0" indent="0">
+              <a:buNone/>
+            </a:pPr>
+            <a:r>
+              <a:rPr lang="en-US" sz="3600" dirty="0"/>
+              <a:t>We heard Azure Cosmos DB is compatible with MongoDB. Will this provide a migration that minimized code changes?</a:t>
+            </a:r>
+          </a:p>
+          <a:p>
+            <a:endParaRPr lang="en-US" sz="2800" dirty="0">
+              <a:latin typeface="+mn-lt"/>
+            </a:endParaRPr>
+          </a:p>
+          <a:p>
+            <a:r>
+              <a:rPr lang="en-US" sz="2800" dirty="0">
+                <a:latin typeface="+mn-lt"/>
+              </a:rPr>
+              <a:t>Azure Cosmos DB supports multiple NoSQL data models; including supporting a MongoDB API. This provides compatibility for code written for MongoDB to communicate with Cosmos DB without code changes; for easier migration and interoperability.</a:t>
+            </a:r>
+          </a:p>
+          <a:p>
+            <a:endParaRPr lang="en-US" dirty="0"/>
+          </a:p>
+        </p:txBody>
+      </p:sp>
+    </p:spTree>
+    <p:extLst>
+      <p:ext uri="{BB962C8B-B14F-4D97-AF65-F5344CB8AC3E}">
+        <p14:creationId xmlns:p14="http://schemas.microsoft.com/office/powerpoint/2010/main" val="244504347"/>
+      </p:ext>
+    </p:extLst>
+  </p:cSld>
+  <p:clrMapOvr>
+    <a:masterClrMapping/>
+  </p:clrMapOvr>
+  <p:transition>
+    <p:fade/>
+  </p:transition>
+</p:sld>
+</file>
+
+<file path=ppt/slides/slide25.xml><?xml version="1.0" encoding="utf-8"?>
+<p:sld xmlns:a="http://schemas.openxmlformats.org/drawingml/2006/main" xmlns:r="http://schemas.openxmlformats.org/officeDocument/2006/relationships" xmlns:p="http://schemas.openxmlformats.org/presentationml/2006/main">
+  <p:cSld>
+    <p:spTree>
+      <p:nvGrpSpPr>
+        <p:cNvPr id="1" name=""/>
+        <p:cNvGrpSpPr/>
+        <p:nvPr/>
+      </p:nvGrpSpPr>
+      <p:grpSpPr>
+        <a:xfrm>
+          <a:off x="0" y="0"/>
+          <a:ext cx="0" cy="0"/>
+          <a:chOff x="0" y="0"/>
+          <a:chExt cx="0" cy="0"/>
+        </a:xfrm>
+      </p:grpSpPr>
+      <p:sp>
+        <p:nvSpPr>
+          <p:cNvPr id="3" name="Title 2">
+            <a:extLst>
+              <a:ext uri="{FF2B5EF4-FFF2-40B4-BE49-F238E27FC236}">
+                <a16:creationId xmlns:a16="http://schemas.microsoft.com/office/drawing/2014/main" id="{6EF4C784-5137-C84F-90DE-319C49E447A9}"/>
+              </a:ext>
+            </a:extLst>
+          </p:cNvPr>
+          <p:cNvSpPr>
+            <a:spLocks noGrp="1"/>
+          </p:cNvSpPr>
+          <p:nvPr>
+            <p:ph type="title"/>
+          </p:nvPr>
+        </p:nvSpPr>
+        <p:spPr/>
+        <p:txBody>
+          <a:bodyPr vert="horz" wrap="square" lIns="146304" tIns="91440" rIns="146304" bIns="91440" rtlCol="0" anchor="t">
+            <a:normAutofit/>
+          </a:bodyPr>
+          <a:lstStyle/>
+          <a:p>
+            <a:r>
+              <a:rPr lang="en-US" sz="4400" dirty="0">
+                <a:solidFill>
+                  <a:schemeClr val="tx1"/>
+                </a:solidFill>
+              </a:rPr>
               <a:t>Preferred objection handling 4</a:t>
             </a:r>
           </a:p>
@@ -18290,7 +18610,7 @@
 </p:sld>
 </file>
 
-<file path=ppt/slides/slide25.xml><?xml version="1.0" encoding="utf-8"?>
+<file path=ppt/slides/slide26.xml><?xml version="1.0" encoding="utf-8"?>
 <p:sld xmlns:a="http://schemas.openxmlformats.org/drawingml/2006/main" xmlns:r="http://schemas.openxmlformats.org/officeDocument/2006/relationships" xmlns:p="http://schemas.openxmlformats.org/presentationml/2006/main">
   <p:cSld>
     <p:spTree>
@@ -18461,7 +18781,7 @@
 </p:sld>
 </file>
 
-<file path=ppt/slides/slide26.xml><?xml version="1.0" encoding="utf-8"?>
+<file path=ppt/slides/slide27.xml><?xml version="1.0" encoding="utf-8"?>
 <p:sld xmlns:a="http://schemas.openxmlformats.org/drawingml/2006/main" xmlns:r="http://schemas.openxmlformats.org/officeDocument/2006/relationships" xmlns:p="http://schemas.openxmlformats.org/presentationml/2006/main">
   <p:cSld>
     <p:bg>

</xml_diff>